<commit_message>
Did reflection before exam and added mongodb part to presentation
</commit_message>
<xml_diff>
--- a/Presentatie.pptx
+++ b/Presentatie.pptx
@@ -122,6 +122,97 @@
 </p:presentation>
 </file>
 
+<file path=ppt/revisionInfo.xml><?xml version="1.0" encoding="utf-8"?>
+<p1510:revInfo xmlns:a="http://schemas.openxmlformats.org/drawingml/2006/main" xmlns:r="http://schemas.openxmlformats.org/officeDocument/2006/relationships" xmlns:p1510="http://schemas.microsoft.com/office/powerpoint/2015/10/main">
+  <p1510:revLst>
+    <p1510:client id="{F3E1E097-396B-4351-BB80-BBF05EFE94FF}" v="3" dt="2022-11-06T21:48:11.503"/>
+  </p1510:revLst>
+</p1510:revInfo>
+</file>
+
+<file path=ppt/changesInfos/changesInfo1.xml><?xml version="1.0" encoding="utf-8"?>
+<pc:chgInfo xmlns:a="http://schemas.openxmlformats.org/drawingml/2006/main" xmlns:r="http://schemas.openxmlformats.org/officeDocument/2006/relationships" xmlns:ac="http://schemas.microsoft.com/office/drawing/2013/main/command" xmlns:pc="http://schemas.microsoft.com/office/powerpoint/2013/main/command">
+  <pc:docChgLst>
+    <pc:chgData name="Jonas Leijzen" userId="e39d7f93f1dd7ed7" providerId="LiveId" clId="{F3E1E097-396B-4351-BB80-BBF05EFE94FF}"/>
+    <pc:docChg chg="undo custSel addSld delSld modSld">
+      <pc:chgData name="Jonas Leijzen" userId="e39d7f93f1dd7ed7" providerId="LiveId" clId="{F3E1E097-396B-4351-BB80-BBF05EFE94FF}" dt="2022-11-06T22:16:28.518" v="408" actId="20577"/>
+      <pc:docMkLst>
+        <pc:docMk/>
+      </pc:docMkLst>
+      <pc:sldChg chg="addSp delSp modSp mod">
+        <pc:chgData name="Jonas Leijzen" userId="e39d7f93f1dd7ed7" providerId="LiveId" clId="{F3E1E097-396B-4351-BB80-BBF05EFE94FF}" dt="2022-11-06T21:47:36.137" v="15" actId="478"/>
+        <pc:sldMkLst>
+          <pc:docMk/>
+          <pc:sldMk cId="1946860266" sldId="273"/>
+        </pc:sldMkLst>
+        <pc:picChg chg="add del mod">
+          <ac:chgData name="Jonas Leijzen" userId="e39d7f93f1dd7ed7" providerId="LiveId" clId="{F3E1E097-396B-4351-BB80-BBF05EFE94FF}" dt="2022-11-06T21:47:36.137" v="15" actId="478"/>
+          <ac:picMkLst>
+            <pc:docMk/>
+            <pc:sldMk cId="1946860266" sldId="273"/>
+            <ac:picMk id="6" creationId="{B136DDA3-61B1-3499-8334-A7BE5E5EE911}"/>
+          </ac:picMkLst>
+        </pc:picChg>
+      </pc:sldChg>
+      <pc:sldChg chg="addSp delSp modSp mod">
+        <pc:chgData name="Jonas Leijzen" userId="e39d7f93f1dd7ed7" providerId="LiveId" clId="{F3E1E097-396B-4351-BB80-BBF05EFE94FF}" dt="2022-11-06T22:16:28.518" v="408" actId="20577"/>
+        <pc:sldMkLst>
+          <pc:docMk/>
+          <pc:sldMk cId="1674013678" sldId="274"/>
+        </pc:sldMkLst>
+        <pc:spChg chg="add mod">
+          <ac:chgData name="Jonas Leijzen" userId="e39d7f93f1dd7ed7" providerId="LiveId" clId="{F3E1E097-396B-4351-BB80-BBF05EFE94FF}" dt="2022-11-06T22:16:28.518" v="408" actId="20577"/>
+          <ac:spMkLst>
+            <pc:docMk/>
+            <pc:sldMk cId="1674013678" sldId="274"/>
+            <ac:spMk id="6" creationId="{F10F8F79-E1B6-0F91-CCBC-ED84F56F6284}"/>
+          </ac:spMkLst>
+        </pc:spChg>
+        <pc:spChg chg="del mod">
+          <ac:chgData name="Jonas Leijzen" userId="e39d7f93f1dd7ed7" providerId="LiveId" clId="{F3E1E097-396B-4351-BB80-BBF05EFE94FF}" dt="2022-11-06T21:44:50.053" v="5"/>
+          <ac:spMkLst>
+            <pc:docMk/>
+            <pc:sldMk cId="1674013678" sldId="274"/>
+            <ac:spMk id="184" creationId="{BED93381-124D-4F83-9A70-983905BCDEE5}"/>
+          </ac:spMkLst>
+        </pc:spChg>
+        <pc:grpChg chg="del">
+          <ac:chgData name="Jonas Leijzen" userId="e39d7f93f1dd7ed7" providerId="LiveId" clId="{F3E1E097-396B-4351-BB80-BBF05EFE94FF}" dt="2022-11-06T21:44:50.833" v="6" actId="478"/>
+          <ac:grpSpMkLst>
+            <pc:docMk/>
+            <pc:sldMk cId="1674013678" sldId="274"/>
+            <ac:grpSpMk id="181" creationId="{3F7F3BCE-10A9-4059-8E7A-286F7D6A5CF7}"/>
+          </ac:grpSpMkLst>
+        </pc:grpChg>
+        <pc:picChg chg="add mod">
+          <ac:chgData name="Jonas Leijzen" userId="e39d7f93f1dd7ed7" providerId="LiveId" clId="{F3E1E097-396B-4351-BB80-BBF05EFE94FF}" dt="2022-11-06T21:45:33.894" v="11" actId="1076"/>
+          <ac:picMkLst>
+            <pc:docMk/>
+            <pc:sldMk cId="1674013678" sldId="274"/>
+            <ac:picMk id="5" creationId="{49B9FE59-CEEE-A4BF-CDAD-5DB3E6D2E36C}"/>
+          </ac:picMkLst>
+        </pc:picChg>
+      </pc:sldChg>
+      <pc:sldChg chg="modSp new del mod">
+        <pc:chgData name="Jonas Leijzen" userId="e39d7f93f1dd7ed7" providerId="LiveId" clId="{F3E1E097-396B-4351-BB80-BBF05EFE94FF}" dt="2022-11-06T21:44:41.823" v="2" actId="47"/>
+        <pc:sldMkLst>
+          <pc:docMk/>
+          <pc:sldMk cId="3212093222" sldId="276"/>
+        </pc:sldMkLst>
+        <pc:spChg chg="mod">
+          <ac:chgData name="Jonas Leijzen" userId="e39d7f93f1dd7ed7" providerId="LiveId" clId="{F3E1E097-396B-4351-BB80-BBF05EFE94FF}" dt="2022-11-06T21:44:38.808" v="1"/>
+          <ac:spMkLst>
+            <pc:docMk/>
+            <pc:sldMk cId="3212093222" sldId="276"/>
+            <ac:spMk id="2" creationId="{BEF075C4-3D82-38E3-4C28-ECECEB0AAD9A}"/>
+          </ac:spMkLst>
+        </pc:spChg>
+      </pc:sldChg>
+    </pc:docChg>
+  </pc:docChgLst>
+</pc:chgInfo>
+</file>
+
 <file path=ppt/notesMasters/notesMaster1.xml><?xml version="1.0" encoding="utf-8"?>
 <p:notesMaster xmlns:a="http://schemas.openxmlformats.org/drawingml/2006/main" xmlns:r="http://schemas.openxmlformats.org/officeDocument/2006/relationships" xmlns:p="http://schemas.openxmlformats.org/presentationml/2006/main">
   <p:cSld>
@@ -204,7 +295,7 @@
           <a:p>
             <a:fld id="{A034EED6-39AB-4311-872A-0192AD9FD702}" type="datetimeFigureOut">
               <a:rPr lang="en-US" smtClean="0"/>
-              <a:t>11/4/2022</a:t>
+              <a:t>11/6/2022</a:t>
             </a:fld>
             <a:endParaRPr lang="en-US"/>
           </a:p>
@@ -600,7 +691,7 @@
           <a:p>
             <a:fld id="{A545F807-836F-4D5D-874B-A69A7FCC58CB}" type="datetime1">
               <a:rPr lang="en-US" smtClean="0"/>
-              <a:t>11/4/2022</a:t>
+              <a:t>11/6/2022</a:t>
             </a:fld>
             <a:endParaRPr lang="en-US"/>
           </a:p>
@@ -768,7 +859,7 @@
           <a:p>
             <a:fld id="{54DB6B26-6A9F-4406-92F5-6D332EF95DFD}" type="datetime1">
               <a:rPr lang="en-US" smtClean="0"/>
-              <a:t>11/4/2022</a:t>
+              <a:t>11/6/2022</a:t>
             </a:fld>
             <a:endParaRPr lang="en-US"/>
           </a:p>
@@ -946,7 +1037,7 @@
           <a:p>
             <a:fld id="{F7CFF9CC-CF3B-44C1-BD85-CB8CD18212E2}" type="datetime1">
               <a:rPr lang="en-US" smtClean="0"/>
-              <a:t>11/4/2022</a:t>
+              <a:t>11/6/2022</a:t>
             </a:fld>
             <a:endParaRPr lang="en-US"/>
           </a:p>
@@ -1114,7 +1205,7 @@
           <a:p>
             <a:fld id="{3938454D-FE39-42CD-BE11-AE96EA6800B4}" type="datetime1">
               <a:rPr lang="en-US" smtClean="0"/>
-              <a:t>11/4/2022</a:t>
+              <a:t>11/6/2022</a:t>
             </a:fld>
             <a:endParaRPr lang="en-US"/>
           </a:p>
@@ -1359,7 +1450,7 @@
           <a:p>
             <a:fld id="{15AC4295-CAF5-4ECE-9BA5-421ACF1724F7}" type="datetime1">
               <a:rPr lang="en-US" smtClean="0"/>
-              <a:t>11/4/2022</a:t>
+              <a:t>11/6/2022</a:t>
             </a:fld>
             <a:endParaRPr lang="en-US"/>
           </a:p>
@@ -1588,7 +1679,7 @@
           <a:p>
             <a:fld id="{2029BD38-4644-4DB7-ADAE-2B6E91DEDF25}" type="datetime1">
               <a:rPr lang="en-US" smtClean="0"/>
-              <a:t>11/4/2022</a:t>
+              <a:t>11/6/2022</a:t>
             </a:fld>
             <a:endParaRPr lang="en-US"/>
           </a:p>
@@ -1952,7 +2043,7 @@
           <a:p>
             <a:fld id="{58564C8A-517D-4C94-BE03-FFC67836ECF0}" type="datetime1">
               <a:rPr lang="en-US" smtClean="0"/>
-              <a:t>11/4/2022</a:t>
+              <a:t>11/6/2022</a:t>
             </a:fld>
             <a:endParaRPr lang="en-US"/>
           </a:p>
@@ -2069,7 +2160,7 @@
           <a:p>
             <a:fld id="{4385644D-08C9-4441-852A-03B1F7D1FA80}" type="datetime1">
               <a:rPr lang="en-US" smtClean="0"/>
-              <a:t>11/4/2022</a:t>
+              <a:t>11/6/2022</a:t>
             </a:fld>
             <a:endParaRPr lang="en-US"/>
           </a:p>
@@ -2164,7 +2255,7 @@
           <a:p>
             <a:fld id="{139B5574-D002-4381-8804-EAFBB3510711}" type="datetime1">
               <a:rPr lang="en-US" smtClean="0"/>
-              <a:t>11/4/2022</a:t>
+              <a:t>11/6/2022</a:t>
             </a:fld>
             <a:endParaRPr lang="en-US"/>
           </a:p>
@@ -2439,7 +2530,7 @@
           <a:p>
             <a:fld id="{5A68FAAE-7C8C-41FE-8695-DFED53AB67E3}" type="datetime1">
               <a:rPr lang="en-US" smtClean="0"/>
-              <a:t>11/4/2022</a:t>
+              <a:t>11/6/2022</a:t>
             </a:fld>
             <a:endParaRPr lang="en-US"/>
           </a:p>
@@ -2691,7 +2782,7 @@
           <a:p>
             <a:fld id="{B07D2DBE-2391-4857-A636-DE70DBBA9206}" type="datetime1">
               <a:rPr lang="en-US" smtClean="0"/>
-              <a:t>11/4/2022</a:t>
+              <a:t>11/6/2022</a:t>
             </a:fld>
             <a:endParaRPr lang="en-US"/>
           </a:p>
@@ -2902,7 +2993,7 @@
           <a:p>
             <a:fld id="{E7551C38-A972-4C75-A1F0-A0F671BCE3E0}" type="datetime1">
               <a:rPr lang="en-US" smtClean="0"/>
-              <a:t>11/4/2022</a:t>
+              <a:t>11/6/2022</a:t>
             </a:fld>
             <a:endParaRPr lang="en-US"/>
           </a:p>
@@ -3858,7 +3949,7 @@
           <a:p>
             <a:fld id="{5D2A5BCA-CFD9-4AED-A589-E41154D4A6DF}" type="datetime1">
               <a:rPr lang="en-US" smtClean="0"/>
-              <a:t>11/4/2022</a:t>
+              <a:t>11/6/2022</a:t>
             </a:fld>
             <a:endParaRPr lang="en-US"/>
           </a:p>
@@ -4597,7 +4688,7 @@
           <a:p>
             <a:fld id="{5D2A5BCA-CFD9-4AED-A589-E41154D4A6DF}" type="datetime1">
               <a:rPr lang="en-US" smtClean="0"/>
-              <a:t>11/4/2022</a:t>
+              <a:t>11/6/2022</a:t>
             </a:fld>
             <a:endParaRPr lang="en-US"/>
           </a:p>
@@ -5126,7 +5217,7 @@
           <a:p>
             <a:fld id="{5D2A5BCA-CFD9-4AED-A589-E41154D4A6DF}" type="datetime1">
               <a:rPr lang="en-US" smtClean="0"/>
-              <a:t>11/4/2022</a:t>
+              <a:t>11/6/2022</a:t>
             </a:fld>
             <a:endParaRPr lang="en-US"/>
           </a:p>
@@ -5512,7 +5603,7 @@
           <a:p>
             <a:fld id="{5D2A5BCA-CFD9-4AED-A589-E41154D4A6DF}" type="datetime1">
               <a:rPr lang="en-US" smtClean="0"/>
-              <a:t>11/4/2022</a:t>
+              <a:t>11/6/2022</a:t>
             </a:fld>
             <a:endParaRPr lang="en-US"/>
           </a:p>
@@ -5996,2104 +6087,6 @@
           <a:chExt cx="0" cy="0"/>
         </a:xfrm>
       </p:grpSpPr>
-      <p:grpSp>
-        <p:nvGrpSpPr>
-          <p:cNvPr id="181" name="Group 180">
-            <a:extLst>
-              <a:ext uri="{FF2B5EF4-FFF2-40B4-BE49-F238E27FC236}">
-                <a16:creationId xmlns:a16="http://schemas.microsoft.com/office/drawing/2014/main" id="{3F7F3BCE-10A9-4059-8E7A-286F7D6A5CF7}"/>
-              </a:ext>
-            </a:extLst>
-          </p:cNvPr>
-          <p:cNvGrpSpPr/>
-          <p:nvPr/>
-        </p:nvGrpSpPr>
-        <p:grpSpPr>
-          <a:xfrm>
-            <a:off x="8847862" y="2041137"/>
-            <a:ext cx="285750" cy="214313"/>
-            <a:chOff x="2614613" y="809625"/>
-            <a:chExt cx="285750" cy="214313"/>
-          </a:xfrm>
-          <a:solidFill>
-            <a:srgbClr val="1C819E"/>
-          </a:solidFill>
-        </p:grpSpPr>
-        <p:sp>
-          <p:nvSpPr>
-            <p:cNvPr id="182" name="Freeform 78">
-              <a:extLst>
-                <a:ext uri="{FF2B5EF4-FFF2-40B4-BE49-F238E27FC236}">
-                  <a16:creationId xmlns:a16="http://schemas.microsoft.com/office/drawing/2014/main" id="{1F27A54E-0FBC-4700-B090-2AAC791B3D1D}"/>
-                </a:ext>
-              </a:extLst>
-            </p:cNvPr>
-            <p:cNvSpPr>
-              <a:spLocks/>
-            </p:cNvSpPr>
-            <p:nvPr/>
-          </p:nvSpPr>
-          <p:spPr bwMode="auto">
-            <a:xfrm>
-              <a:off x="2614613" y="809625"/>
-              <a:ext cx="133350" cy="214313"/>
-            </a:xfrm>
-            <a:custGeom>
-              <a:avLst/>
-              <a:gdLst>
-                <a:gd name="T0" fmla="*/ 316 w 335"/>
-                <a:gd name="T1" fmla="*/ 47 h 540"/>
-                <a:gd name="T2" fmla="*/ 325 w 335"/>
-                <a:gd name="T3" fmla="*/ 43 h 540"/>
-                <a:gd name="T4" fmla="*/ 331 w 335"/>
-                <a:gd name="T5" fmla="*/ 37 h 540"/>
-                <a:gd name="T6" fmla="*/ 335 w 335"/>
-                <a:gd name="T7" fmla="*/ 28 h 540"/>
-                <a:gd name="T8" fmla="*/ 335 w 335"/>
-                <a:gd name="T9" fmla="*/ 19 h 540"/>
-                <a:gd name="T10" fmla="*/ 331 w 335"/>
-                <a:gd name="T11" fmla="*/ 10 h 540"/>
-                <a:gd name="T12" fmla="*/ 325 w 335"/>
-                <a:gd name="T13" fmla="*/ 4 h 540"/>
-                <a:gd name="T14" fmla="*/ 316 w 335"/>
-                <a:gd name="T15" fmla="*/ 0 h 540"/>
-                <a:gd name="T16" fmla="*/ 294 w 335"/>
-                <a:gd name="T17" fmla="*/ 0 h 540"/>
-                <a:gd name="T18" fmla="*/ 260 w 335"/>
-                <a:gd name="T19" fmla="*/ 3 h 540"/>
-                <a:gd name="T20" fmla="*/ 227 w 335"/>
-                <a:gd name="T21" fmla="*/ 10 h 540"/>
-                <a:gd name="T22" fmla="*/ 198 w 335"/>
-                <a:gd name="T23" fmla="*/ 20 h 540"/>
-                <a:gd name="T24" fmla="*/ 169 w 335"/>
-                <a:gd name="T25" fmla="*/ 33 h 540"/>
-                <a:gd name="T26" fmla="*/ 142 w 335"/>
-                <a:gd name="T27" fmla="*/ 49 h 540"/>
-                <a:gd name="T28" fmla="*/ 117 w 335"/>
-                <a:gd name="T29" fmla="*/ 68 h 540"/>
-                <a:gd name="T30" fmla="*/ 95 w 335"/>
-                <a:gd name="T31" fmla="*/ 89 h 540"/>
-                <a:gd name="T32" fmla="*/ 75 w 335"/>
-                <a:gd name="T33" fmla="*/ 113 h 540"/>
-                <a:gd name="T34" fmla="*/ 57 w 335"/>
-                <a:gd name="T35" fmla="*/ 141 h 540"/>
-                <a:gd name="T36" fmla="*/ 41 w 335"/>
-                <a:gd name="T37" fmla="*/ 170 h 540"/>
-                <a:gd name="T38" fmla="*/ 27 w 335"/>
-                <a:gd name="T39" fmla="*/ 202 h 540"/>
-                <a:gd name="T40" fmla="*/ 17 w 335"/>
-                <a:gd name="T41" fmla="*/ 236 h 540"/>
-                <a:gd name="T42" fmla="*/ 8 w 335"/>
-                <a:gd name="T43" fmla="*/ 272 h 540"/>
-                <a:gd name="T44" fmla="*/ 3 w 335"/>
-                <a:gd name="T45" fmla="*/ 310 h 540"/>
-                <a:gd name="T46" fmla="*/ 0 w 335"/>
-                <a:gd name="T47" fmla="*/ 351 h 540"/>
-                <a:gd name="T48" fmla="*/ 1 w 335"/>
-                <a:gd name="T49" fmla="*/ 390 h 540"/>
-                <a:gd name="T50" fmla="*/ 7 w 335"/>
-                <a:gd name="T51" fmla="*/ 422 h 540"/>
-                <a:gd name="T52" fmla="*/ 20 w 335"/>
-                <a:gd name="T53" fmla="*/ 452 h 540"/>
-                <a:gd name="T54" fmla="*/ 38 w 335"/>
-                <a:gd name="T55" fmla="*/ 478 h 540"/>
-                <a:gd name="T56" fmla="*/ 61 w 335"/>
-                <a:gd name="T57" fmla="*/ 502 h 540"/>
-                <a:gd name="T58" fmla="*/ 88 w 335"/>
-                <a:gd name="T59" fmla="*/ 520 h 540"/>
-                <a:gd name="T60" fmla="*/ 117 w 335"/>
-                <a:gd name="T61" fmla="*/ 532 h 540"/>
-                <a:gd name="T62" fmla="*/ 150 w 335"/>
-                <a:gd name="T63" fmla="*/ 539 h 540"/>
-                <a:gd name="T64" fmla="*/ 185 w 335"/>
-                <a:gd name="T65" fmla="*/ 539 h 540"/>
-                <a:gd name="T66" fmla="*/ 218 w 335"/>
-                <a:gd name="T67" fmla="*/ 532 h 540"/>
-                <a:gd name="T68" fmla="*/ 248 w 335"/>
-                <a:gd name="T69" fmla="*/ 520 h 540"/>
-                <a:gd name="T70" fmla="*/ 274 w 335"/>
-                <a:gd name="T71" fmla="*/ 502 h 540"/>
-                <a:gd name="T72" fmla="*/ 297 w 335"/>
-                <a:gd name="T73" fmla="*/ 478 h 540"/>
-                <a:gd name="T74" fmla="*/ 315 w 335"/>
-                <a:gd name="T75" fmla="*/ 452 h 540"/>
-                <a:gd name="T76" fmla="*/ 328 w 335"/>
-                <a:gd name="T77" fmla="*/ 422 h 540"/>
-                <a:gd name="T78" fmla="*/ 334 w 335"/>
-                <a:gd name="T79" fmla="*/ 390 h 540"/>
-                <a:gd name="T80" fmla="*/ 334 w 335"/>
-                <a:gd name="T81" fmla="*/ 355 h 540"/>
-                <a:gd name="T82" fmla="*/ 328 w 335"/>
-                <a:gd name="T83" fmla="*/ 322 h 540"/>
-                <a:gd name="T84" fmla="*/ 315 w 335"/>
-                <a:gd name="T85" fmla="*/ 292 h 540"/>
-                <a:gd name="T86" fmla="*/ 297 w 335"/>
-                <a:gd name="T87" fmla="*/ 265 h 540"/>
-                <a:gd name="T88" fmla="*/ 274 w 335"/>
-                <a:gd name="T89" fmla="*/ 242 h 540"/>
-                <a:gd name="T90" fmla="*/ 248 w 335"/>
-                <a:gd name="T91" fmla="*/ 224 h 540"/>
-                <a:gd name="T92" fmla="*/ 218 w 335"/>
-                <a:gd name="T93" fmla="*/ 212 h 540"/>
-                <a:gd name="T94" fmla="*/ 185 w 335"/>
-                <a:gd name="T95" fmla="*/ 204 h 540"/>
-                <a:gd name="T96" fmla="*/ 153 w 335"/>
-                <a:gd name="T97" fmla="*/ 204 h 540"/>
-                <a:gd name="T98" fmla="*/ 126 w 335"/>
-                <a:gd name="T99" fmla="*/ 209 h 540"/>
-                <a:gd name="T100" fmla="*/ 99 w 335"/>
-                <a:gd name="T101" fmla="*/ 218 h 540"/>
-                <a:gd name="T102" fmla="*/ 76 w 335"/>
-                <a:gd name="T103" fmla="*/ 232 h 540"/>
-                <a:gd name="T104" fmla="*/ 73 w 335"/>
-                <a:gd name="T105" fmla="*/ 214 h 540"/>
-                <a:gd name="T106" fmla="*/ 94 w 335"/>
-                <a:gd name="T107" fmla="*/ 170 h 540"/>
-                <a:gd name="T108" fmla="*/ 119 w 335"/>
-                <a:gd name="T109" fmla="*/ 133 h 540"/>
-                <a:gd name="T110" fmla="*/ 150 w 335"/>
-                <a:gd name="T111" fmla="*/ 104 h 540"/>
-                <a:gd name="T112" fmla="*/ 183 w 335"/>
-                <a:gd name="T113" fmla="*/ 80 h 540"/>
-                <a:gd name="T114" fmla="*/ 218 w 335"/>
-                <a:gd name="T115" fmla="*/ 64 h 540"/>
-                <a:gd name="T116" fmla="*/ 255 w 335"/>
-                <a:gd name="T117" fmla="*/ 54 h 540"/>
-                <a:gd name="T118" fmla="*/ 293 w 335"/>
-                <a:gd name="T119" fmla="*/ 49 h 540"/>
-              </a:gdLst>
-              <a:ahLst/>
-              <a:cxnLst>
-                <a:cxn ang="0">
-                  <a:pos x="T0" y="T1"/>
-                </a:cxn>
-                <a:cxn ang="0">
-                  <a:pos x="T2" y="T3"/>
-                </a:cxn>
-                <a:cxn ang="0">
-                  <a:pos x="T4" y="T5"/>
-                </a:cxn>
-                <a:cxn ang="0">
-                  <a:pos x="T6" y="T7"/>
-                </a:cxn>
-                <a:cxn ang="0">
-                  <a:pos x="T8" y="T9"/>
-                </a:cxn>
-                <a:cxn ang="0">
-                  <a:pos x="T10" y="T11"/>
-                </a:cxn>
-                <a:cxn ang="0">
-                  <a:pos x="T12" y="T13"/>
-                </a:cxn>
-                <a:cxn ang="0">
-                  <a:pos x="T14" y="T15"/>
-                </a:cxn>
-                <a:cxn ang="0">
-                  <a:pos x="T16" y="T17"/>
-                </a:cxn>
-                <a:cxn ang="0">
-                  <a:pos x="T18" y="T19"/>
-                </a:cxn>
-                <a:cxn ang="0">
-                  <a:pos x="T20" y="T21"/>
-                </a:cxn>
-                <a:cxn ang="0">
-                  <a:pos x="T22" y="T23"/>
-                </a:cxn>
-                <a:cxn ang="0">
-                  <a:pos x="T24" y="T25"/>
-                </a:cxn>
-                <a:cxn ang="0">
-                  <a:pos x="T26" y="T27"/>
-                </a:cxn>
-                <a:cxn ang="0">
-                  <a:pos x="T28" y="T29"/>
-                </a:cxn>
-                <a:cxn ang="0">
-                  <a:pos x="T30" y="T31"/>
-                </a:cxn>
-                <a:cxn ang="0">
-                  <a:pos x="T32" y="T33"/>
-                </a:cxn>
-                <a:cxn ang="0">
-                  <a:pos x="T34" y="T35"/>
-                </a:cxn>
-                <a:cxn ang="0">
-                  <a:pos x="T36" y="T37"/>
-                </a:cxn>
-                <a:cxn ang="0">
-                  <a:pos x="T38" y="T39"/>
-                </a:cxn>
-                <a:cxn ang="0">
-                  <a:pos x="T40" y="T41"/>
-                </a:cxn>
-                <a:cxn ang="0">
-                  <a:pos x="T42" y="T43"/>
-                </a:cxn>
-                <a:cxn ang="0">
-                  <a:pos x="T44" y="T45"/>
-                </a:cxn>
-                <a:cxn ang="0">
-                  <a:pos x="T46" y="T47"/>
-                </a:cxn>
-                <a:cxn ang="0">
-                  <a:pos x="T48" y="T49"/>
-                </a:cxn>
-                <a:cxn ang="0">
-                  <a:pos x="T50" y="T51"/>
-                </a:cxn>
-                <a:cxn ang="0">
-                  <a:pos x="T52" y="T53"/>
-                </a:cxn>
-                <a:cxn ang="0">
-                  <a:pos x="T54" y="T55"/>
-                </a:cxn>
-                <a:cxn ang="0">
-                  <a:pos x="T56" y="T57"/>
-                </a:cxn>
-                <a:cxn ang="0">
-                  <a:pos x="T58" y="T59"/>
-                </a:cxn>
-                <a:cxn ang="0">
-                  <a:pos x="T60" y="T61"/>
-                </a:cxn>
-                <a:cxn ang="0">
-                  <a:pos x="T62" y="T63"/>
-                </a:cxn>
-                <a:cxn ang="0">
-                  <a:pos x="T64" y="T65"/>
-                </a:cxn>
-                <a:cxn ang="0">
-                  <a:pos x="T66" y="T67"/>
-                </a:cxn>
-                <a:cxn ang="0">
-                  <a:pos x="T68" y="T69"/>
-                </a:cxn>
-                <a:cxn ang="0">
-                  <a:pos x="T70" y="T71"/>
-                </a:cxn>
-                <a:cxn ang="0">
-                  <a:pos x="T72" y="T73"/>
-                </a:cxn>
-                <a:cxn ang="0">
-                  <a:pos x="T74" y="T75"/>
-                </a:cxn>
-                <a:cxn ang="0">
-                  <a:pos x="T76" y="T77"/>
-                </a:cxn>
-                <a:cxn ang="0">
-                  <a:pos x="T78" y="T79"/>
-                </a:cxn>
-                <a:cxn ang="0">
-                  <a:pos x="T80" y="T81"/>
-                </a:cxn>
-                <a:cxn ang="0">
-                  <a:pos x="T82" y="T83"/>
-                </a:cxn>
-                <a:cxn ang="0">
-                  <a:pos x="T84" y="T85"/>
-                </a:cxn>
-                <a:cxn ang="0">
-                  <a:pos x="T86" y="T87"/>
-                </a:cxn>
-                <a:cxn ang="0">
-                  <a:pos x="T88" y="T89"/>
-                </a:cxn>
-                <a:cxn ang="0">
-                  <a:pos x="T90" y="T91"/>
-                </a:cxn>
-                <a:cxn ang="0">
-                  <a:pos x="T92" y="T93"/>
-                </a:cxn>
-                <a:cxn ang="0">
-                  <a:pos x="T94" y="T95"/>
-                </a:cxn>
-                <a:cxn ang="0">
-                  <a:pos x="T96" y="T97"/>
-                </a:cxn>
-                <a:cxn ang="0">
-                  <a:pos x="T98" y="T99"/>
-                </a:cxn>
-                <a:cxn ang="0">
-                  <a:pos x="T100" y="T101"/>
-                </a:cxn>
-                <a:cxn ang="0">
-                  <a:pos x="T102" y="T103"/>
-                </a:cxn>
-                <a:cxn ang="0">
-                  <a:pos x="T104" y="T105"/>
-                </a:cxn>
-                <a:cxn ang="0">
-                  <a:pos x="T106" y="T107"/>
-                </a:cxn>
-                <a:cxn ang="0">
-                  <a:pos x="T108" y="T109"/>
-                </a:cxn>
-                <a:cxn ang="0">
-                  <a:pos x="T110" y="T111"/>
-                </a:cxn>
-                <a:cxn ang="0">
-                  <a:pos x="T112" y="T113"/>
-                </a:cxn>
-                <a:cxn ang="0">
-                  <a:pos x="T114" y="T115"/>
-                </a:cxn>
-                <a:cxn ang="0">
-                  <a:pos x="T116" y="T117"/>
-                </a:cxn>
-                <a:cxn ang="0">
-                  <a:pos x="T118" y="T119"/>
-                </a:cxn>
-              </a:cxnLst>
-              <a:rect l="0" t="0" r="r" b="b"/>
-              <a:pathLst>
-                <a:path w="335" h="540">
-                  <a:moveTo>
-                    <a:pt x="312" y="47"/>
-                  </a:moveTo>
-                  <a:lnTo>
-                    <a:pt x="316" y="47"/>
-                  </a:lnTo>
-                  <a:lnTo>
-                    <a:pt x="321" y="45"/>
-                  </a:lnTo>
-                  <a:lnTo>
-                    <a:pt x="325" y="43"/>
-                  </a:lnTo>
-                  <a:lnTo>
-                    <a:pt x="329" y="41"/>
-                  </a:lnTo>
-                  <a:lnTo>
-                    <a:pt x="331" y="37"/>
-                  </a:lnTo>
-                  <a:lnTo>
-                    <a:pt x="333" y="33"/>
-                  </a:lnTo>
-                  <a:lnTo>
-                    <a:pt x="335" y="28"/>
-                  </a:lnTo>
-                  <a:lnTo>
-                    <a:pt x="335" y="24"/>
-                  </a:lnTo>
-                  <a:lnTo>
-                    <a:pt x="335" y="19"/>
-                  </a:lnTo>
-                  <a:lnTo>
-                    <a:pt x="333" y="15"/>
-                  </a:lnTo>
-                  <a:lnTo>
-                    <a:pt x="331" y="10"/>
-                  </a:lnTo>
-                  <a:lnTo>
-                    <a:pt x="329" y="6"/>
-                  </a:lnTo>
-                  <a:lnTo>
-                    <a:pt x="325" y="4"/>
-                  </a:lnTo>
-                  <a:lnTo>
-                    <a:pt x="321" y="2"/>
-                  </a:lnTo>
-                  <a:lnTo>
-                    <a:pt x="316" y="0"/>
-                  </a:lnTo>
-                  <a:lnTo>
-                    <a:pt x="312" y="0"/>
-                  </a:lnTo>
-                  <a:lnTo>
-                    <a:pt x="294" y="0"/>
-                  </a:lnTo>
-                  <a:lnTo>
-                    <a:pt x="277" y="1"/>
-                  </a:lnTo>
-                  <a:lnTo>
-                    <a:pt x="260" y="3"/>
-                  </a:lnTo>
-                  <a:lnTo>
-                    <a:pt x="244" y="6"/>
-                  </a:lnTo>
-                  <a:lnTo>
-                    <a:pt x="227" y="10"/>
-                  </a:lnTo>
-                  <a:lnTo>
-                    <a:pt x="213" y="15"/>
-                  </a:lnTo>
-                  <a:lnTo>
-                    <a:pt x="198" y="20"/>
-                  </a:lnTo>
-                  <a:lnTo>
-                    <a:pt x="183" y="26"/>
-                  </a:lnTo>
-                  <a:lnTo>
-                    <a:pt x="169" y="33"/>
-                  </a:lnTo>
-                  <a:lnTo>
-                    <a:pt x="155" y="40"/>
-                  </a:lnTo>
-                  <a:lnTo>
-                    <a:pt x="142" y="49"/>
-                  </a:lnTo>
-                  <a:lnTo>
-                    <a:pt x="130" y="58"/>
-                  </a:lnTo>
-                  <a:lnTo>
-                    <a:pt x="117" y="68"/>
-                  </a:lnTo>
-                  <a:lnTo>
-                    <a:pt x="106" y="78"/>
-                  </a:lnTo>
-                  <a:lnTo>
-                    <a:pt x="95" y="89"/>
-                  </a:lnTo>
-                  <a:lnTo>
-                    <a:pt x="84" y="101"/>
-                  </a:lnTo>
-                  <a:lnTo>
-                    <a:pt x="75" y="113"/>
-                  </a:lnTo>
-                  <a:lnTo>
-                    <a:pt x="65" y="127"/>
-                  </a:lnTo>
-                  <a:lnTo>
-                    <a:pt x="57" y="141"/>
-                  </a:lnTo>
-                  <a:lnTo>
-                    <a:pt x="48" y="154"/>
-                  </a:lnTo>
-                  <a:lnTo>
-                    <a:pt x="41" y="170"/>
-                  </a:lnTo>
-                  <a:lnTo>
-                    <a:pt x="34" y="185"/>
-                  </a:lnTo>
-                  <a:lnTo>
-                    <a:pt x="27" y="202"/>
-                  </a:lnTo>
-                  <a:lnTo>
-                    <a:pt x="22" y="218"/>
-                  </a:lnTo>
-                  <a:lnTo>
-                    <a:pt x="17" y="236"/>
-                  </a:lnTo>
-                  <a:lnTo>
-                    <a:pt x="12" y="254"/>
-                  </a:lnTo>
-                  <a:lnTo>
-                    <a:pt x="8" y="272"/>
-                  </a:lnTo>
-                  <a:lnTo>
-                    <a:pt x="5" y="291"/>
-                  </a:lnTo>
-                  <a:lnTo>
-                    <a:pt x="3" y="310"/>
-                  </a:lnTo>
-                  <a:lnTo>
-                    <a:pt x="1" y="330"/>
-                  </a:lnTo>
-                  <a:lnTo>
-                    <a:pt x="0" y="351"/>
-                  </a:lnTo>
-                  <a:lnTo>
-                    <a:pt x="0" y="371"/>
-                  </a:lnTo>
-                  <a:lnTo>
-                    <a:pt x="1" y="390"/>
-                  </a:lnTo>
-                  <a:lnTo>
-                    <a:pt x="3" y="405"/>
-                  </a:lnTo>
-                  <a:lnTo>
-                    <a:pt x="7" y="422"/>
-                  </a:lnTo>
-                  <a:lnTo>
-                    <a:pt x="12" y="437"/>
-                  </a:lnTo>
-                  <a:lnTo>
-                    <a:pt x="20" y="452"/>
-                  </a:lnTo>
-                  <a:lnTo>
-                    <a:pt x="28" y="466"/>
-                  </a:lnTo>
-                  <a:lnTo>
-                    <a:pt x="38" y="478"/>
-                  </a:lnTo>
-                  <a:lnTo>
-                    <a:pt x="48" y="491"/>
-                  </a:lnTo>
-                  <a:lnTo>
-                    <a:pt x="61" y="502"/>
-                  </a:lnTo>
-                  <a:lnTo>
-                    <a:pt x="74" y="511"/>
-                  </a:lnTo>
-                  <a:lnTo>
-                    <a:pt x="88" y="520"/>
-                  </a:lnTo>
-                  <a:lnTo>
-                    <a:pt x="102" y="527"/>
-                  </a:lnTo>
-                  <a:lnTo>
-                    <a:pt x="117" y="532"/>
-                  </a:lnTo>
-                  <a:lnTo>
-                    <a:pt x="134" y="537"/>
-                  </a:lnTo>
-                  <a:lnTo>
-                    <a:pt x="150" y="539"/>
-                  </a:lnTo>
-                  <a:lnTo>
-                    <a:pt x="168" y="540"/>
-                  </a:lnTo>
-                  <a:lnTo>
-                    <a:pt x="185" y="539"/>
-                  </a:lnTo>
-                  <a:lnTo>
-                    <a:pt x="201" y="537"/>
-                  </a:lnTo>
-                  <a:lnTo>
-                    <a:pt x="218" y="532"/>
-                  </a:lnTo>
-                  <a:lnTo>
-                    <a:pt x="233" y="527"/>
-                  </a:lnTo>
-                  <a:lnTo>
-                    <a:pt x="248" y="520"/>
-                  </a:lnTo>
-                  <a:lnTo>
-                    <a:pt x="261" y="511"/>
-                  </a:lnTo>
-                  <a:lnTo>
-                    <a:pt x="274" y="502"/>
-                  </a:lnTo>
-                  <a:lnTo>
-                    <a:pt x="287" y="491"/>
-                  </a:lnTo>
-                  <a:lnTo>
-                    <a:pt x="297" y="478"/>
-                  </a:lnTo>
-                  <a:lnTo>
-                    <a:pt x="307" y="466"/>
-                  </a:lnTo>
-                  <a:lnTo>
-                    <a:pt x="315" y="452"/>
-                  </a:lnTo>
-                  <a:lnTo>
-                    <a:pt x="323" y="437"/>
-                  </a:lnTo>
-                  <a:lnTo>
-                    <a:pt x="328" y="422"/>
-                  </a:lnTo>
-                  <a:lnTo>
-                    <a:pt x="332" y="405"/>
-                  </a:lnTo>
-                  <a:lnTo>
-                    <a:pt x="334" y="390"/>
-                  </a:lnTo>
-                  <a:lnTo>
-                    <a:pt x="335" y="371"/>
-                  </a:lnTo>
-                  <a:lnTo>
-                    <a:pt x="334" y="355"/>
-                  </a:lnTo>
-                  <a:lnTo>
-                    <a:pt x="332" y="338"/>
-                  </a:lnTo>
-                  <a:lnTo>
-                    <a:pt x="328" y="322"/>
-                  </a:lnTo>
-                  <a:lnTo>
-                    <a:pt x="323" y="307"/>
-                  </a:lnTo>
-                  <a:lnTo>
-                    <a:pt x="315" y="292"/>
-                  </a:lnTo>
-                  <a:lnTo>
-                    <a:pt x="307" y="278"/>
-                  </a:lnTo>
-                  <a:lnTo>
-                    <a:pt x="297" y="265"/>
-                  </a:lnTo>
-                  <a:lnTo>
-                    <a:pt x="287" y="253"/>
-                  </a:lnTo>
-                  <a:lnTo>
-                    <a:pt x="274" y="242"/>
-                  </a:lnTo>
-                  <a:lnTo>
-                    <a:pt x="261" y="233"/>
-                  </a:lnTo>
-                  <a:lnTo>
-                    <a:pt x="248" y="224"/>
-                  </a:lnTo>
-                  <a:lnTo>
-                    <a:pt x="233" y="217"/>
-                  </a:lnTo>
-                  <a:lnTo>
-                    <a:pt x="218" y="212"/>
-                  </a:lnTo>
-                  <a:lnTo>
-                    <a:pt x="201" y="207"/>
-                  </a:lnTo>
-                  <a:lnTo>
-                    <a:pt x="185" y="204"/>
-                  </a:lnTo>
-                  <a:lnTo>
-                    <a:pt x="168" y="204"/>
-                  </a:lnTo>
-                  <a:lnTo>
-                    <a:pt x="153" y="204"/>
-                  </a:lnTo>
-                  <a:lnTo>
-                    <a:pt x="140" y="206"/>
-                  </a:lnTo>
-                  <a:lnTo>
-                    <a:pt x="126" y="209"/>
-                  </a:lnTo>
-                  <a:lnTo>
-                    <a:pt x="112" y="213"/>
-                  </a:lnTo>
-                  <a:lnTo>
-                    <a:pt x="99" y="218"/>
-                  </a:lnTo>
-                  <a:lnTo>
-                    <a:pt x="88" y="224"/>
-                  </a:lnTo>
-                  <a:lnTo>
-                    <a:pt x="76" y="232"/>
-                  </a:lnTo>
-                  <a:lnTo>
-                    <a:pt x="64" y="239"/>
-                  </a:lnTo>
-                  <a:lnTo>
-                    <a:pt x="73" y="214"/>
-                  </a:lnTo>
-                  <a:lnTo>
-                    <a:pt x="83" y="191"/>
-                  </a:lnTo>
-                  <a:lnTo>
-                    <a:pt x="94" y="170"/>
-                  </a:lnTo>
-                  <a:lnTo>
-                    <a:pt x="107" y="150"/>
-                  </a:lnTo>
-                  <a:lnTo>
-                    <a:pt x="119" y="133"/>
-                  </a:lnTo>
-                  <a:lnTo>
-                    <a:pt x="134" y="117"/>
-                  </a:lnTo>
-                  <a:lnTo>
-                    <a:pt x="150" y="104"/>
-                  </a:lnTo>
-                  <a:lnTo>
-                    <a:pt x="166" y="91"/>
-                  </a:lnTo>
-                  <a:lnTo>
-                    <a:pt x="183" y="80"/>
-                  </a:lnTo>
-                  <a:lnTo>
-                    <a:pt x="200" y="72"/>
-                  </a:lnTo>
-                  <a:lnTo>
-                    <a:pt x="218" y="64"/>
-                  </a:lnTo>
-                  <a:lnTo>
-                    <a:pt x="237" y="58"/>
-                  </a:lnTo>
-                  <a:lnTo>
-                    <a:pt x="255" y="54"/>
-                  </a:lnTo>
-                  <a:lnTo>
-                    <a:pt x="274" y="51"/>
-                  </a:lnTo>
-                  <a:lnTo>
-                    <a:pt x="293" y="49"/>
-                  </a:lnTo>
-                  <a:lnTo>
-                    <a:pt x="312" y="47"/>
-                  </a:lnTo>
-                  <a:close/>
-                </a:path>
-              </a:pathLst>
-            </a:custGeom>
-            <a:grpFill/>
-            <a:ln>
-              <a:noFill/>
-            </a:ln>
-            <a:extLst>
-              <a:ext uri="{91240B29-F687-4F45-9708-019B960494DF}">
-                <a14:hiddenLine xmlns:a14="http://schemas.microsoft.com/office/drawing/2010/main" w="9525">
-                  <a:solidFill>
-                    <a:srgbClr val="000000"/>
-                  </a:solidFill>
-                  <a:round/>
-                  <a:headEnd/>
-                  <a:tailEnd/>
-                </a14:hiddenLine>
-              </a:ext>
-            </a:extLst>
-          </p:spPr>
-          <p:txBody>
-            <a:bodyPr vert="horz" wrap="square" lIns="91440" tIns="45720" rIns="91440" bIns="45720" numCol="1" anchor="t" anchorCtr="0" compatLnSpc="1">
-              <a:prstTxWarp prst="textNoShape">
-                <a:avLst/>
-              </a:prstTxWarp>
-            </a:bodyPr>
-            <a:lstStyle/>
-            <a:p>
-              <a:endParaRPr lang="en-US">
-                <a:latin typeface="A GALEGA" pitchFamily="50" charset="0"/>
-              </a:endParaRPr>
-            </a:p>
-          </p:txBody>
-        </p:sp>
-        <p:sp>
-          <p:nvSpPr>
-            <p:cNvPr id="183" name="Freeform 79">
-              <a:extLst>
-                <a:ext uri="{FF2B5EF4-FFF2-40B4-BE49-F238E27FC236}">
-                  <a16:creationId xmlns:a16="http://schemas.microsoft.com/office/drawing/2014/main" id="{D3A9D34C-588C-457C-B2F6-460EE830A4A4}"/>
-                </a:ext>
-              </a:extLst>
-            </p:cNvPr>
-            <p:cNvSpPr>
-              <a:spLocks/>
-            </p:cNvSpPr>
-            <p:nvPr/>
-          </p:nvSpPr>
-          <p:spPr bwMode="auto">
-            <a:xfrm>
-              <a:off x="2767013" y="809625"/>
-              <a:ext cx="133350" cy="214313"/>
-            </a:xfrm>
-            <a:custGeom>
-              <a:avLst/>
-              <a:gdLst>
-                <a:gd name="T0" fmla="*/ 154 w 336"/>
-                <a:gd name="T1" fmla="*/ 204 h 540"/>
-                <a:gd name="T2" fmla="*/ 126 w 336"/>
-                <a:gd name="T3" fmla="*/ 209 h 540"/>
-                <a:gd name="T4" fmla="*/ 100 w 336"/>
-                <a:gd name="T5" fmla="*/ 218 h 540"/>
-                <a:gd name="T6" fmla="*/ 76 w 336"/>
-                <a:gd name="T7" fmla="*/ 232 h 540"/>
-                <a:gd name="T8" fmla="*/ 73 w 336"/>
-                <a:gd name="T9" fmla="*/ 214 h 540"/>
-                <a:gd name="T10" fmla="*/ 94 w 336"/>
-                <a:gd name="T11" fmla="*/ 170 h 540"/>
-                <a:gd name="T12" fmla="*/ 120 w 336"/>
-                <a:gd name="T13" fmla="*/ 133 h 540"/>
-                <a:gd name="T14" fmla="*/ 150 w 336"/>
-                <a:gd name="T15" fmla="*/ 104 h 540"/>
-                <a:gd name="T16" fmla="*/ 183 w 336"/>
-                <a:gd name="T17" fmla="*/ 80 h 540"/>
-                <a:gd name="T18" fmla="*/ 218 w 336"/>
-                <a:gd name="T19" fmla="*/ 64 h 540"/>
-                <a:gd name="T20" fmla="*/ 255 w 336"/>
-                <a:gd name="T21" fmla="*/ 54 h 540"/>
-                <a:gd name="T22" fmla="*/ 294 w 336"/>
-                <a:gd name="T23" fmla="*/ 49 h 540"/>
-                <a:gd name="T24" fmla="*/ 317 w 336"/>
-                <a:gd name="T25" fmla="*/ 47 h 540"/>
-                <a:gd name="T26" fmla="*/ 325 w 336"/>
-                <a:gd name="T27" fmla="*/ 43 h 540"/>
-                <a:gd name="T28" fmla="*/ 332 w 336"/>
-                <a:gd name="T29" fmla="*/ 37 h 540"/>
-                <a:gd name="T30" fmla="*/ 336 w 336"/>
-                <a:gd name="T31" fmla="*/ 28 h 540"/>
-                <a:gd name="T32" fmla="*/ 336 w 336"/>
-                <a:gd name="T33" fmla="*/ 19 h 540"/>
-                <a:gd name="T34" fmla="*/ 332 w 336"/>
-                <a:gd name="T35" fmla="*/ 10 h 540"/>
-                <a:gd name="T36" fmla="*/ 325 w 336"/>
-                <a:gd name="T37" fmla="*/ 4 h 540"/>
-                <a:gd name="T38" fmla="*/ 317 w 336"/>
-                <a:gd name="T39" fmla="*/ 0 h 540"/>
-                <a:gd name="T40" fmla="*/ 295 w 336"/>
-                <a:gd name="T41" fmla="*/ 0 h 540"/>
-                <a:gd name="T42" fmla="*/ 261 w 336"/>
-                <a:gd name="T43" fmla="*/ 3 h 540"/>
-                <a:gd name="T44" fmla="*/ 228 w 336"/>
-                <a:gd name="T45" fmla="*/ 10 h 540"/>
-                <a:gd name="T46" fmla="*/ 198 w 336"/>
-                <a:gd name="T47" fmla="*/ 20 h 540"/>
-                <a:gd name="T48" fmla="*/ 170 w 336"/>
-                <a:gd name="T49" fmla="*/ 33 h 540"/>
-                <a:gd name="T50" fmla="*/ 142 w 336"/>
-                <a:gd name="T51" fmla="*/ 49 h 540"/>
-                <a:gd name="T52" fmla="*/ 118 w 336"/>
-                <a:gd name="T53" fmla="*/ 68 h 540"/>
-                <a:gd name="T54" fmla="*/ 96 w 336"/>
-                <a:gd name="T55" fmla="*/ 89 h 540"/>
-                <a:gd name="T56" fmla="*/ 75 w 336"/>
-                <a:gd name="T57" fmla="*/ 113 h 540"/>
-                <a:gd name="T58" fmla="*/ 56 w 336"/>
-                <a:gd name="T59" fmla="*/ 141 h 540"/>
-                <a:gd name="T60" fmla="*/ 42 w 336"/>
-                <a:gd name="T61" fmla="*/ 170 h 540"/>
-                <a:gd name="T62" fmla="*/ 28 w 336"/>
-                <a:gd name="T63" fmla="*/ 202 h 540"/>
-                <a:gd name="T64" fmla="*/ 17 w 336"/>
-                <a:gd name="T65" fmla="*/ 236 h 540"/>
-                <a:gd name="T66" fmla="*/ 9 w 336"/>
-                <a:gd name="T67" fmla="*/ 272 h 540"/>
-                <a:gd name="T68" fmla="*/ 3 w 336"/>
-                <a:gd name="T69" fmla="*/ 310 h 540"/>
-                <a:gd name="T70" fmla="*/ 0 w 336"/>
-                <a:gd name="T71" fmla="*/ 351 h 540"/>
-                <a:gd name="T72" fmla="*/ 0 w 336"/>
-                <a:gd name="T73" fmla="*/ 390 h 540"/>
-                <a:gd name="T74" fmla="*/ 8 w 336"/>
-                <a:gd name="T75" fmla="*/ 422 h 540"/>
-                <a:gd name="T76" fmla="*/ 20 w 336"/>
-                <a:gd name="T77" fmla="*/ 452 h 540"/>
-                <a:gd name="T78" fmla="*/ 38 w 336"/>
-                <a:gd name="T79" fmla="*/ 478 h 540"/>
-                <a:gd name="T80" fmla="*/ 61 w 336"/>
-                <a:gd name="T81" fmla="*/ 502 h 540"/>
-                <a:gd name="T82" fmla="*/ 88 w 336"/>
-                <a:gd name="T83" fmla="*/ 520 h 540"/>
-                <a:gd name="T84" fmla="*/ 118 w 336"/>
-                <a:gd name="T85" fmla="*/ 532 h 540"/>
-                <a:gd name="T86" fmla="*/ 151 w 336"/>
-                <a:gd name="T87" fmla="*/ 539 h 540"/>
-                <a:gd name="T88" fmla="*/ 186 w 336"/>
-                <a:gd name="T89" fmla="*/ 539 h 540"/>
-                <a:gd name="T90" fmla="*/ 218 w 336"/>
-                <a:gd name="T91" fmla="*/ 532 h 540"/>
-                <a:gd name="T92" fmla="*/ 248 w 336"/>
-                <a:gd name="T93" fmla="*/ 520 h 540"/>
-                <a:gd name="T94" fmla="*/ 275 w 336"/>
-                <a:gd name="T95" fmla="*/ 502 h 540"/>
-                <a:gd name="T96" fmla="*/ 298 w 336"/>
-                <a:gd name="T97" fmla="*/ 478 h 540"/>
-                <a:gd name="T98" fmla="*/ 316 w 336"/>
-                <a:gd name="T99" fmla="*/ 452 h 540"/>
-                <a:gd name="T100" fmla="*/ 329 w 336"/>
-                <a:gd name="T101" fmla="*/ 422 h 540"/>
-                <a:gd name="T102" fmla="*/ 335 w 336"/>
-                <a:gd name="T103" fmla="*/ 390 h 540"/>
-                <a:gd name="T104" fmla="*/ 335 w 336"/>
-                <a:gd name="T105" fmla="*/ 355 h 540"/>
-                <a:gd name="T106" fmla="*/ 329 w 336"/>
-                <a:gd name="T107" fmla="*/ 322 h 540"/>
-                <a:gd name="T108" fmla="*/ 316 w 336"/>
-                <a:gd name="T109" fmla="*/ 292 h 540"/>
-                <a:gd name="T110" fmla="*/ 298 w 336"/>
-                <a:gd name="T111" fmla="*/ 265 h 540"/>
-                <a:gd name="T112" fmla="*/ 275 w 336"/>
-                <a:gd name="T113" fmla="*/ 242 h 540"/>
-                <a:gd name="T114" fmla="*/ 248 w 336"/>
-                <a:gd name="T115" fmla="*/ 224 h 540"/>
-                <a:gd name="T116" fmla="*/ 218 w 336"/>
-                <a:gd name="T117" fmla="*/ 212 h 540"/>
-                <a:gd name="T118" fmla="*/ 186 w 336"/>
-                <a:gd name="T119" fmla="*/ 204 h 540"/>
-              </a:gdLst>
-              <a:ahLst/>
-              <a:cxnLst>
-                <a:cxn ang="0">
-                  <a:pos x="T0" y="T1"/>
-                </a:cxn>
-                <a:cxn ang="0">
-                  <a:pos x="T2" y="T3"/>
-                </a:cxn>
-                <a:cxn ang="0">
-                  <a:pos x="T4" y="T5"/>
-                </a:cxn>
-                <a:cxn ang="0">
-                  <a:pos x="T6" y="T7"/>
-                </a:cxn>
-                <a:cxn ang="0">
-                  <a:pos x="T8" y="T9"/>
-                </a:cxn>
-                <a:cxn ang="0">
-                  <a:pos x="T10" y="T11"/>
-                </a:cxn>
-                <a:cxn ang="0">
-                  <a:pos x="T12" y="T13"/>
-                </a:cxn>
-                <a:cxn ang="0">
-                  <a:pos x="T14" y="T15"/>
-                </a:cxn>
-                <a:cxn ang="0">
-                  <a:pos x="T16" y="T17"/>
-                </a:cxn>
-                <a:cxn ang="0">
-                  <a:pos x="T18" y="T19"/>
-                </a:cxn>
-                <a:cxn ang="0">
-                  <a:pos x="T20" y="T21"/>
-                </a:cxn>
-                <a:cxn ang="0">
-                  <a:pos x="T22" y="T23"/>
-                </a:cxn>
-                <a:cxn ang="0">
-                  <a:pos x="T24" y="T25"/>
-                </a:cxn>
-                <a:cxn ang="0">
-                  <a:pos x="T26" y="T27"/>
-                </a:cxn>
-                <a:cxn ang="0">
-                  <a:pos x="T28" y="T29"/>
-                </a:cxn>
-                <a:cxn ang="0">
-                  <a:pos x="T30" y="T31"/>
-                </a:cxn>
-                <a:cxn ang="0">
-                  <a:pos x="T32" y="T33"/>
-                </a:cxn>
-                <a:cxn ang="0">
-                  <a:pos x="T34" y="T35"/>
-                </a:cxn>
-                <a:cxn ang="0">
-                  <a:pos x="T36" y="T37"/>
-                </a:cxn>
-                <a:cxn ang="0">
-                  <a:pos x="T38" y="T39"/>
-                </a:cxn>
-                <a:cxn ang="0">
-                  <a:pos x="T40" y="T41"/>
-                </a:cxn>
-                <a:cxn ang="0">
-                  <a:pos x="T42" y="T43"/>
-                </a:cxn>
-                <a:cxn ang="0">
-                  <a:pos x="T44" y="T45"/>
-                </a:cxn>
-                <a:cxn ang="0">
-                  <a:pos x="T46" y="T47"/>
-                </a:cxn>
-                <a:cxn ang="0">
-                  <a:pos x="T48" y="T49"/>
-                </a:cxn>
-                <a:cxn ang="0">
-                  <a:pos x="T50" y="T51"/>
-                </a:cxn>
-                <a:cxn ang="0">
-                  <a:pos x="T52" y="T53"/>
-                </a:cxn>
-                <a:cxn ang="0">
-                  <a:pos x="T54" y="T55"/>
-                </a:cxn>
-                <a:cxn ang="0">
-                  <a:pos x="T56" y="T57"/>
-                </a:cxn>
-                <a:cxn ang="0">
-                  <a:pos x="T58" y="T59"/>
-                </a:cxn>
-                <a:cxn ang="0">
-                  <a:pos x="T60" y="T61"/>
-                </a:cxn>
-                <a:cxn ang="0">
-                  <a:pos x="T62" y="T63"/>
-                </a:cxn>
-                <a:cxn ang="0">
-                  <a:pos x="T64" y="T65"/>
-                </a:cxn>
-                <a:cxn ang="0">
-                  <a:pos x="T66" y="T67"/>
-                </a:cxn>
-                <a:cxn ang="0">
-                  <a:pos x="T68" y="T69"/>
-                </a:cxn>
-                <a:cxn ang="0">
-                  <a:pos x="T70" y="T71"/>
-                </a:cxn>
-                <a:cxn ang="0">
-                  <a:pos x="T72" y="T73"/>
-                </a:cxn>
-                <a:cxn ang="0">
-                  <a:pos x="T74" y="T75"/>
-                </a:cxn>
-                <a:cxn ang="0">
-                  <a:pos x="T76" y="T77"/>
-                </a:cxn>
-                <a:cxn ang="0">
-                  <a:pos x="T78" y="T79"/>
-                </a:cxn>
-                <a:cxn ang="0">
-                  <a:pos x="T80" y="T81"/>
-                </a:cxn>
-                <a:cxn ang="0">
-                  <a:pos x="T82" y="T83"/>
-                </a:cxn>
-                <a:cxn ang="0">
-                  <a:pos x="T84" y="T85"/>
-                </a:cxn>
-                <a:cxn ang="0">
-                  <a:pos x="T86" y="T87"/>
-                </a:cxn>
-                <a:cxn ang="0">
-                  <a:pos x="T88" y="T89"/>
-                </a:cxn>
-                <a:cxn ang="0">
-                  <a:pos x="T90" y="T91"/>
-                </a:cxn>
-                <a:cxn ang="0">
-                  <a:pos x="T92" y="T93"/>
-                </a:cxn>
-                <a:cxn ang="0">
-                  <a:pos x="T94" y="T95"/>
-                </a:cxn>
-                <a:cxn ang="0">
-                  <a:pos x="T96" y="T97"/>
-                </a:cxn>
-                <a:cxn ang="0">
-                  <a:pos x="T98" y="T99"/>
-                </a:cxn>
-                <a:cxn ang="0">
-                  <a:pos x="T100" y="T101"/>
-                </a:cxn>
-                <a:cxn ang="0">
-                  <a:pos x="T102" y="T103"/>
-                </a:cxn>
-                <a:cxn ang="0">
-                  <a:pos x="T104" y="T105"/>
-                </a:cxn>
-                <a:cxn ang="0">
-                  <a:pos x="T106" y="T107"/>
-                </a:cxn>
-                <a:cxn ang="0">
-                  <a:pos x="T108" y="T109"/>
-                </a:cxn>
-                <a:cxn ang="0">
-                  <a:pos x="T110" y="T111"/>
-                </a:cxn>
-                <a:cxn ang="0">
-                  <a:pos x="T112" y="T113"/>
-                </a:cxn>
-                <a:cxn ang="0">
-                  <a:pos x="T114" y="T115"/>
-                </a:cxn>
-                <a:cxn ang="0">
-                  <a:pos x="T116" y="T117"/>
-                </a:cxn>
-                <a:cxn ang="0">
-                  <a:pos x="T118" y="T119"/>
-                </a:cxn>
-              </a:cxnLst>
-              <a:rect l="0" t="0" r="r" b="b"/>
-              <a:pathLst>
-                <a:path w="336" h="540">
-                  <a:moveTo>
-                    <a:pt x="168" y="204"/>
-                  </a:moveTo>
-                  <a:lnTo>
-                    <a:pt x="154" y="204"/>
-                  </a:lnTo>
-                  <a:lnTo>
-                    <a:pt x="140" y="206"/>
-                  </a:lnTo>
-                  <a:lnTo>
-                    <a:pt x="126" y="209"/>
-                  </a:lnTo>
-                  <a:lnTo>
-                    <a:pt x="112" y="213"/>
-                  </a:lnTo>
-                  <a:lnTo>
-                    <a:pt x="100" y="218"/>
-                  </a:lnTo>
-                  <a:lnTo>
-                    <a:pt x="88" y="224"/>
-                  </a:lnTo>
-                  <a:lnTo>
-                    <a:pt x="76" y="232"/>
-                  </a:lnTo>
-                  <a:lnTo>
-                    <a:pt x="65" y="239"/>
-                  </a:lnTo>
-                  <a:lnTo>
-                    <a:pt x="73" y="214"/>
-                  </a:lnTo>
-                  <a:lnTo>
-                    <a:pt x="83" y="191"/>
-                  </a:lnTo>
-                  <a:lnTo>
-                    <a:pt x="94" y="170"/>
-                  </a:lnTo>
-                  <a:lnTo>
-                    <a:pt x="107" y="150"/>
-                  </a:lnTo>
-                  <a:lnTo>
-                    <a:pt x="120" y="133"/>
-                  </a:lnTo>
-                  <a:lnTo>
-                    <a:pt x="135" y="117"/>
-                  </a:lnTo>
-                  <a:lnTo>
-                    <a:pt x="150" y="104"/>
-                  </a:lnTo>
-                  <a:lnTo>
-                    <a:pt x="167" y="91"/>
-                  </a:lnTo>
-                  <a:lnTo>
-                    <a:pt x="183" y="80"/>
-                  </a:lnTo>
-                  <a:lnTo>
-                    <a:pt x="200" y="72"/>
-                  </a:lnTo>
-                  <a:lnTo>
-                    <a:pt x="218" y="64"/>
-                  </a:lnTo>
-                  <a:lnTo>
-                    <a:pt x="236" y="58"/>
-                  </a:lnTo>
-                  <a:lnTo>
-                    <a:pt x="255" y="54"/>
-                  </a:lnTo>
-                  <a:lnTo>
-                    <a:pt x="275" y="51"/>
-                  </a:lnTo>
-                  <a:lnTo>
-                    <a:pt x="294" y="49"/>
-                  </a:lnTo>
-                  <a:lnTo>
-                    <a:pt x="313" y="47"/>
-                  </a:lnTo>
-                  <a:lnTo>
-                    <a:pt x="317" y="47"/>
-                  </a:lnTo>
-                  <a:lnTo>
-                    <a:pt x="321" y="45"/>
-                  </a:lnTo>
-                  <a:lnTo>
-                    <a:pt x="325" y="43"/>
-                  </a:lnTo>
-                  <a:lnTo>
-                    <a:pt x="330" y="41"/>
-                  </a:lnTo>
-                  <a:lnTo>
-                    <a:pt x="332" y="37"/>
-                  </a:lnTo>
-                  <a:lnTo>
-                    <a:pt x="334" y="33"/>
-                  </a:lnTo>
-                  <a:lnTo>
-                    <a:pt x="336" y="28"/>
-                  </a:lnTo>
-                  <a:lnTo>
-                    <a:pt x="336" y="24"/>
-                  </a:lnTo>
-                  <a:lnTo>
-                    <a:pt x="336" y="19"/>
-                  </a:lnTo>
-                  <a:lnTo>
-                    <a:pt x="334" y="15"/>
-                  </a:lnTo>
-                  <a:lnTo>
-                    <a:pt x="332" y="10"/>
-                  </a:lnTo>
-                  <a:lnTo>
-                    <a:pt x="330" y="6"/>
-                  </a:lnTo>
-                  <a:lnTo>
-                    <a:pt x="325" y="4"/>
-                  </a:lnTo>
-                  <a:lnTo>
-                    <a:pt x="321" y="2"/>
-                  </a:lnTo>
-                  <a:lnTo>
-                    <a:pt x="317" y="0"/>
-                  </a:lnTo>
-                  <a:lnTo>
-                    <a:pt x="313" y="0"/>
-                  </a:lnTo>
-                  <a:lnTo>
-                    <a:pt x="295" y="0"/>
-                  </a:lnTo>
-                  <a:lnTo>
-                    <a:pt x="278" y="1"/>
-                  </a:lnTo>
-                  <a:lnTo>
-                    <a:pt x="261" y="3"/>
-                  </a:lnTo>
-                  <a:lnTo>
-                    <a:pt x="244" y="6"/>
-                  </a:lnTo>
-                  <a:lnTo>
-                    <a:pt x="228" y="10"/>
-                  </a:lnTo>
-                  <a:lnTo>
-                    <a:pt x="213" y="15"/>
-                  </a:lnTo>
-                  <a:lnTo>
-                    <a:pt x="198" y="20"/>
-                  </a:lnTo>
-                  <a:lnTo>
-                    <a:pt x="183" y="26"/>
-                  </a:lnTo>
-                  <a:lnTo>
-                    <a:pt x="170" y="33"/>
-                  </a:lnTo>
-                  <a:lnTo>
-                    <a:pt x="156" y="40"/>
-                  </a:lnTo>
-                  <a:lnTo>
-                    <a:pt x="142" y="49"/>
-                  </a:lnTo>
-                  <a:lnTo>
-                    <a:pt x="131" y="58"/>
-                  </a:lnTo>
-                  <a:lnTo>
-                    <a:pt x="118" y="68"/>
-                  </a:lnTo>
-                  <a:lnTo>
-                    <a:pt x="106" y="78"/>
-                  </a:lnTo>
-                  <a:lnTo>
-                    <a:pt x="96" y="89"/>
-                  </a:lnTo>
-                  <a:lnTo>
-                    <a:pt x="85" y="101"/>
-                  </a:lnTo>
-                  <a:lnTo>
-                    <a:pt x="75" y="113"/>
-                  </a:lnTo>
-                  <a:lnTo>
-                    <a:pt x="66" y="127"/>
-                  </a:lnTo>
-                  <a:lnTo>
-                    <a:pt x="56" y="141"/>
-                  </a:lnTo>
-                  <a:lnTo>
-                    <a:pt x="49" y="154"/>
-                  </a:lnTo>
-                  <a:lnTo>
-                    <a:pt x="42" y="170"/>
-                  </a:lnTo>
-                  <a:lnTo>
-                    <a:pt x="34" y="185"/>
-                  </a:lnTo>
-                  <a:lnTo>
-                    <a:pt x="28" y="202"/>
-                  </a:lnTo>
-                  <a:lnTo>
-                    <a:pt x="22" y="218"/>
-                  </a:lnTo>
-                  <a:lnTo>
-                    <a:pt x="17" y="236"/>
-                  </a:lnTo>
-                  <a:lnTo>
-                    <a:pt x="13" y="254"/>
-                  </a:lnTo>
-                  <a:lnTo>
-                    <a:pt x="9" y="272"/>
-                  </a:lnTo>
-                  <a:lnTo>
-                    <a:pt x="6" y="291"/>
-                  </a:lnTo>
-                  <a:lnTo>
-                    <a:pt x="3" y="310"/>
-                  </a:lnTo>
-                  <a:lnTo>
-                    <a:pt x="1" y="330"/>
-                  </a:lnTo>
-                  <a:lnTo>
-                    <a:pt x="0" y="351"/>
-                  </a:lnTo>
-                  <a:lnTo>
-                    <a:pt x="0" y="371"/>
-                  </a:lnTo>
-                  <a:lnTo>
-                    <a:pt x="0" y="390"/>
-                  </a:lnTo>
-                  <a:lnTo>
-                    <a:pt x="3" y="405"/>
-                  </a:lnTo>
-                  <a:lnTo>
-                    <a:pt x="8" y="422"/>
-                  </a:lnTo>
-                  <a:lnTo>
-                    <a:pt x="13" y="437"/>
-                  </a:lnTo>
-                  <a:lnTo>
-                    <a:pt x="20" y="452"/>
-                  </a:lnTo>
-                  <a:lnTo>
-                    <a:pt x="29" y="466"/>
-                  </a:lnTo>
-                  <a:lnTo>
-                    <a:pt x="38" y="478"/>
-                  </a:lnTo>
-                  <a:lnTo>
-                    <a:pt x="49" y="491"/>
-                  </a:lnTo>
-                  <a:lnTo>
-                    <a:pt x="61" y="502"/>
-                  </a:lnTo>
-                  <a:lnTo>
-                    <a:pt x="74" y="511"/>
-                  </a:lnTo>
-                  <a:lnTo>
-                    <a:pt x="88" y="520"/>
-                  </a:lnTo>
-                  <a:lnTo>
-                    <a:pt x="103" y="527"/>
-                  </a:lnTo>
-                  <a:lnTo>
-                    <a:pt x="118" y="532"/>
-                  </a:lnTo>
-                  <a:lnTo>
-                    <a:pt x="134" y="537"/>
-                  </a:lnTo>
-                  <a:lnTo>
-                    <a:pt x="151" y="539"/>
-                  </a:lnTo>
-                  <a:lnTo>
-                    <a:pt x="168" y="540"/>
-                  </a:lnTo>
-                  <a:lnTo>
-                    <a:pt x="186" y="539"/>
-                  </a:lnTo>
-                  <a:lnTo>
-                    <a:pt x="201" y="537"/>
-                  </a:lnTo>
-                  <a:lnTo>
-                    <a:pt x="218" y="532"/>
-                  </a:lnTo>
-                  <a:lnTo>
-                    <a:pt x="233" y="527"/>
-                  </a:lnTo>
-                  <a:lnTo>
-                    <a:pt x="248" y="520"/>
-                  </a:lnTo>
-                  <a:lnTo>
-                    <a:pt x="262" y="511"/>
-                  </a:lnTo>
-                  <a:lnTo>
-                    <a:pt x="275" y="502"/>
-                  </a:lnTo>
-                  <a:lnTo>
-                    <a:pt x="287" y="491"/>
-                  </a:lnTo>
-                  <a:lnTo>
-                    <a:pt x="298" y="478"/>
-                  </a:lnTo>
-                  <a:lnTo>
-                    <a:pt x="307" y="466"/>
-                  </a:lnTo>
-                  <a:lnTo>
-                    <a:pt x="316" y="452"/>
-                  </a:lnTo>
-                  <a:lnTo>
-                    <a:pt x="323" y="437"/>
-                  </a:lnTo>
-                  <a:lnTo>
-                    <a:pt x="329" y="422"/>
-                  </a:lnTo>
-                  <a:lnTo>
-                    <a:pt x="333" y="405"/>
-                  </a:lnTo>
-                  <a:lnTo>
-                    <a:pt x="335" y="390"/>
-                  </a:lnTo>
-                  <a:lnTo>
-                    <a:pt x="336" y="371"/>
-                  </a:lnTo>
-                  <a:lnTo>
-                    <a:pt x="335" y="355"/>
-                  </a:lnTo>
-                  <a:lnTo>
-                    <a:pt x="333" y="338"/>
-                  </a:lnTo>
-                  <a:lnTo>
-                    <a:pt x="329" y="322"/>
-                  </a:lnTo>
-                  <a:lnTo>
-                    <a:pt x="323" y="307"/>
-                  </a:lnTo>
-                  <a:lnTo>
-                    <a:pt x="316" y="292"/>
-                  </a:lnTo>
-                  <a:lnTo>
-                    <a:pt x="307" y="278"/>
-                  </a:lnTo>
-                  <a:lnTo>
-                    <a:pt x="298" y="265"/>
-                  </a:lnTo>
-                  <a:lnTo>
-                    <a:pt x="287" y="253"/>
-                  </a:lnTo>
-                  <a:lnTo>
-                    <a:pt x="275" y="242"/>
-                  </a:lnTo>
-                  <a:lnTo>
-                    <a:pt x="262" y="233"/>
-                  </a:lnTo>
-                  <a:lnTo>
-                    <a:pt x="248" y="224"/>
-                  </a:lnTo>
-                  <a:lnTo>
-                    <a:pt x="233" y="217"/>
-                  </a:lnTo>
-                  <a:lnTo>
-                    <a:pt x="218" y="212"/>
-                  </a:lnTo>
-                  <a:lnTo>
-                    <a:pt x="201" y="207"/>
-                  </a:lnTo>
-                  <a:lnTo>
-                    <a:pt x="186" y="204"/>
-                  </a:lnTo>
-                  <a:lnTo>
-                    <a:pt x="168" y="204"/>
-                  </a:lnTo>
-                  <a:close/>
-                </a:path>
-              </a:pathLst>
-            </a:custGeom>
-            <a:grpFill/>
-            <a:ln>
-              <a:noFill/>
-            </a:ln>
-            <a:extLst>
-              <a:ext uri="{91240B29-F687-4F45-9708-019B960494DF}">
-                <a14:hiddenLine xmlns:a14="http://schemas.microsoft.com/office/drawing/2010/main" w="9525">
-                  <a:solidFill>
-                    <a:srgbClr val="000000"/>
-                  </a:solidFill>
-                  <a:round/>
-                  <a:headEnd/>
-                  <a:tailEnd/>
-                </a14:hiddenLine>
-              </a:ext>
-            </a:extLst>
-          </p:spPr>
-          <p:txBody>
-            <a:bodyPr vert="horz" wrap="square" lIns="91440" tIns="45720" rIns="91440" bIns="45720" numCol="1" anchor="t" anchorCtr="0" compatLnSpc="1">
-              <a:prstTxWarp prst="textNoShape">
-                <a:avLst/>
-              </a:prstTxWarp>
-            </a:bodyPr>
-            <a:lstStyle/>
-            <a:p>
-              <a:endParaRPr lang="en-US">
-                <a:latin typeface="A GALEGA" pitchFamily="50" charset="0"/>
-              </a:endParaRPr>
-            </a:p>
-          </p:txBody>
-        </p:sp>
-      </p:grpSp>
-      <p:sp>
-        <p:nvSpPr>
-          <p:cNvPr id="184" name="Rectangle 183">
-            <a:extLst>
-              <a:ext uri="{FF2B5EF4-FFF2-40B4-BE49-F238E27FC236}">
-                <a16:creationId xmlns:a16="http://schemas.microsoft.com/office/drawing/2014/main" id="{BED93381-124D-4F83-9A70-983905BCDEE5}"/>
-              </a:ext>
-            </a:extLst>
-          </p:cNvPr>
-          <p:cNvSpPr/>
-          <p:nvPr/>
-        </p:nvSpPr>
-        <p:spPr>
-          <a:xfrm>
-            <a:off x="9152662" y="2148293"/>
-            <a:ext cx="2741750" cy="2332946"/>
-          </a:xfrm>
-          <a:prstGeom prst="rect">
-            <a:avLst/>
-          </a:prstGeom>
-        </p:spPr>
-        <p:txBody>
-          <a:bodyPr wrap="square">
-            <a:spAutoFit/>
-          </a:bodyPr>
-          <a:lstStyle/>
-          <a:p>
-            <a:pPr>
-              <a:lnSpc>
-                <a:spcPct val="130000"/>
-              </a:lnSpc>
-            </a:pPr>
-            <a:r>
-              <a:rPr lang="en-US" sz="1400" dirty="0">
-                <a:solidFill>
-                  <a:schemeClr val="tx1">
-                    <a:lumMod val="75000"/>
-                    <a:lumOff val="25000"/>
-                  </a:schemeClr>
-                </a:solidFill>
-                <a:latin typeface="Segoe UI Light" panose="020B0502040204020203" pitchFamily="34" charset="0"/>
-                <a:cs typeface="Segoe UI Light" panose="020B0502040204020203" pitchFamily="34" charset="0"/>
-              </a:rPr>
-              <a:t>Lorem ipsum dolor sit </a:t>
-            </a:r>
-            <a:r>
-              <a:rPr lang="en-US" sz="1400" dirty="0" err="1">
-                <a:solidFill>
-                  <a:schemeClr val="tx1">
-                    <a:lumMod val="75000"/>
-                    <a:lumOff val="25000"/>
-                  </a:schemeClr>
-                </a:solidFill>
-                <a:latin typeface="Segoe UI Light" panose="020B0502040204020203" pitchFamily="34" charset="0"/>
-                <a:cs typeface="Segoe UI Light" panose="020B0502040204020203" pitchFamily="34" charset="0"/>
-              </a:rPr>
-              <a:t>amet</a:t>
-            </a:r>
-            <a:r>
-              <a:rPr lang="en-US" sz="1400" dirty="0">
-                <a:solidFill>
-                  <a:schemeClr val="tx1">
-                    <a:lumMod val="75000"/>
-                    <a:lumOff val="25000"/>
-                  </a:schemeClr>
-                </a:solidFill>
-                <a:latin typeface="Segoe UI Light" panose="020B0502040204020203" pitchFamily="34" charset="0"/>
-                <a:cs typeface="Segoe UI Light" panose="020B0502040204020203" pitchFamily="34" charset="0"/>
-              </a:rPr>
-              <a:t>, </a:t>
-            </a:r>
-            <a:r>
-              <a:rPr lang="en-US" sz="1400" dirty="0" err="1">
-                <a:solidFill>
-                  <a:schemeClr val="tx1">
-                    <a:lumMod val="75000"/>
-                    <a:lumOff val="25000"/>
-                  </a:schemeClr>
-                </a:solidFill>
-                <a:latin typeface="Segoe UI Light" panose="020B0502040204020203" pitchFamily="34" charset="0"/>
-                <a:cs typeface="Segoe UI Light" panose="020B0502040204020203" pitchFamily="34" charset="0"/>
-              </a:rPr>
-              <a:t>consectetur</a:t>
-            </a:r>
-            <a:r>
-              <a:rPr lang="en-US" sz="1400" dirty="0">
-                <a:solidFill>
-                  <a:schemeClr val="tx1">
-                    <a:lumMod val="75000"/>
-                    <a:lumOff val="25000"/>
-                  </a:schemeClr>
-                </a:solidFill>
-                <a:latin typeface="Segoe UI Light" panose="020B0502040204020203" pitchFamily="34" charset="0"/>
-                <a:cs typeface="Segoe UI Light" panose="020B0502040204020203" pitchFamily="34" charset="0"/>
-              </a:rPr>
-              <a:t> </a:t>
-            </a:r>
-            <a:r>
-              <a:rPr lang="en-US" sz="1400" dirty="0" err="1">
-                <a:solidFill>
-                  <a:schemeClr val="tx1">
-                    <a:lumMod val="75000"/>
-                    <a:lumOff val="25000"/>
-                  </a:schemeClr>
-                </a:solidFill>
-                <a:latin typeface="Segoe UI Light" panose="020B0502040204020203" pitchFamily="34" charset="0"/>
-                <a:cs typeface="Segoe UI Light" panose="020B0502040204020203" pitchFamily="34" charset="0"/>
-              </a:rPr>
-              <a:t>adipiscing</a:t>
-            </a:r>
-            <a:r>
-              <a:rPr lang="en-US" sz="1400" dirty="0">
-                <a:solidFill>
-                  <a:schemeClr val="tx1">
-                    <a:lumMod val="75000"/>
-                    <a:lumOff val="25000"/>
-                  </a:schemeClr>
-                </a:solidFill>
-                <a:latin typeface="Segoe UI Light" panose="020B0502040204020203" pitchFamily="34" charset="0"/>
-                <a:cs typeface="Segoe UI Light" panose="020B0502040204020203" pitchFamily="34" charset="0"/>
-              </a:rPr>
-              <a:t> </a:t>
-            </a:r>
-            <a:r>
-              <a:rPr lang="en-US" sz="1400" dirty="0" err="1">
-                <a:solidFill>
-                  <a:schemeClr val="tx1">
-                    <a:lumMod val="75000"/>
-                    <a:lumOff val="25000"/>
-                  </a:schemeClr>
-                </a:solidFill>
-                <a:latin typeface="Segoe UI Light" panose="020B0502040204020203" pitchFamily="34" charset="0"/>
-                <a:cs typeface="Segoe UI Light" panose="020B0502040204020203" pitchFamily="34" charset="0"/>
-              </a:rPr>
-              <a:t>elit</a:t>
-            </a:r>
-            <a:r>
-              <a:rPr lang="en-US" sz="1400" dirty="0">
-                <a:solidFill>
-                  <a:schemeClr val="tx1">
-                    <a:lumMod val="75000"/>
-                    <a:lumOff val="25000"/>
-                  </a:schemeClr>
-                </a:solidFill>
-                <a:latin typeface="Segoe UI Light" panose="020B0502040204020203" pitchFamily="34" charset="0"/>
-                <a:cs typeface="Segoe UI Light" panose="020B0502040204020203" pitchFamily="34" charset="0"/>
-              </a:rPr>
-              <a:t>, </a:t>
-            </a:r>
-            <a:r>
-              <a:rPr lang="en-US" sz="1400" dirty="0" err="1">
-                <a:solidFill>
-                  <a:schemeClr val="tx1">
-                    <a:lumMod val="75000"/>
-                    <a:lumOff val="25000"/>
-                  </a:schemeClr>
-                </a:solidFill>
-                <a:latin typeface="Segoe UI Light" panose="020B0502040204020203" pitchFamily="34" charset="0"/>
-                <a:cs typeface="Segoe UI Light" panose="020B0502040204020203" pitchFamily="34" charset="0"/>
-              </a:rPr>
-              <a:t>sed</a:t>
-            </a:r>
-            <a:r>
-              <a:rPr lang="en-US" sz="1400" dirty="0">
-                <a:solidFill>
-                  <a:schemeClr val="tx1">
-                    <a:lumMod val="75000"/>
-                    <a:lumOff val="25000"/>
-                  </a:schemeClr>
-                </a:solidFill>
-                <a:latin typeface="Segoe UI Light" panose="020B0502040204020203" pitchFamily="34" charset="0"/>
-                <a:cs typeface="Segoe UI Light" panose="020B0502040204020203" pitchFamily="34" charset="0"/>
-              </a:rPr>
-              <a:t> do </a:t>
-            </a:r>
-            <a:r>
-              <a:rPr lang="en-US" sz="1400" dirty="0" err="1">
-                <a:solidFill>
-                  <a:schemeClr val="tx1">
-                    <a:lumMod val="75000"/>
-                    <a:lumOff val="25000"/>
-                  </a:schemeClr>
-                </a:solidFill>
-                <a:latin typeface="Segoe UI Light" panose="020B0502040204020203" pitchFamily="34" charset="0"/>
-                <a:cs typeface="Segoe UI Light" panose="020B0502040204020203" pitchFamily="34" charset="0"/>
-              </a:rPr>
-              <a:t>eiusmod</a:t>
-            </a:r>
-            <a:r>
-              <a:rPr lang="en-US" sz="1400" dirty="0">
-                <a:solidFill>
-                  <a:schemeClr val="tx1">
-                    <a:lumMod val="75000"/>
-                    <a:lumOff val="25000"/>
-                  </a:schemeClr>
-                </a:solidFill>
-                <a:latin typeface="Segoe UI Light" panose="020B0502040204020203" pitchFamily="34" charset="0"/>
-                <a:cs typeface="Segoe UI Light" panose="020B0502040204020203" pitchFamily="34" charset="0"/>
-              </a:rPr>
-              <a:t> </a:t>
-            </a:r>
-            <a:r>
-              <a:rPr lang="en-US" sz="1400" dirty="0" err="1">
-                <a:solidFill>
-                  <a:schemeClr val="tx1">
-                    <a:lumMod val="75000"/>
-                    <a:lumOff val="25000"/>
-                  </a:schemeClr>
-                </a:solidFill>
-                <a:latin typeface="Segoe UI Light" panose="020B0502040204020203" pitchFamily="34" charset="0"/>
-                <a:cs typeface="Segoe UI Light" panose="020B0502040204020203" pitchFamily="34" charset="0"/>
-              </a:rPr>
-              <a:t>tempor</a:t>
-            </a:r>
-            <a:r>
-              <a:rPr lang="en-US" sz="1400" dirty="0">
-                <a:solidFill>
-                  <a:schemeClr val="tx1">
-                    <a:lumMod val="75000"/>
-                    <a:lumOff val="25000"/>
-                  </a:schemeClr>
-                </a:solidFill>
-                <a:latin typeface="Segoe UI Light" panose="020B0502040204020203" pitchFamily="34" charset="0"/>
-                <a:cs typeface="Segoe UI Light" panose="020B0502040204020203" pitchFamily="34" charset="0"/>
-              </a:rPr>
-              <a:t> </a:t>
-            </a:r>
-            <a:r>
-              <a:rPr lang="en-US" sz="1400" dirty="0" err="1">
-                <a:solidFill>
-                  <a:schemeClr val="tx1">
-                    <a:lumMod val="75000"/>
-                    <a:lumOff val="25000"/>
-                  </a:schemeClr>
-                </a:solidFill>
-                <a:latin typeface="Segoe UI Light" panose="020B0502040204020203" pitchFamily="34" charset="0"/>
-                <a:cs typeface="Segoe UI Light" panose="020B0502040204020203" pitchFamily="34" charset="0"/>
-              </a:rPr>
-              <a:t>incididunt</a:t>
-            </a:r>
-            <a:r>
-              <a:rPr lang="en-US" sz="1400" dirty="0">
-                <a:solidFill>
-                  <a:schemeClr val="tx1">
-                    <a:lumMod val="75000"/>
-                    <a:lumOff val="25000"/>
-                  </a:schemeClr>
-                </a:solidFill>
-                <a:latin typeface="Segoe UI Light" panose="020B0502040204020203" pitchFamily="34" charset="0"/>
-                <a:cs typeface="Segoe UI Light" panose="020B0502040204020203" pitchFamily="34" charset="0"/>
-              </a:rPr>
-              <a:t> </a:t>
-            </a:r>
-            <a:r>
-              <a:rPr lang="en-US" sz="1400" dirty="0" err="1">
-                <a:solidFill>
-                  <a:schemeClr val="tx1">
-                    <a:lumMod val="75000"/>
-                    <a:lumOff val="25000"/>
-                  </a:schemeClr>
-                </a:solidFill>
-                <a:latin typeface="Segoe UI Light" panose="020B0502040204020203" pitchFamily="34" charset="0"/>
-                <a:cs typeface="Segoe UI Light" panose="020B0502040204020203" pitchFamily="34" charset="0"/>
-              </a:rPr>
-              <a:t>ut</a:t>
-            </a:r>
-            <a:r>
-              <a:rPr lang="en-US" sz="1400" dirty="0">
-                <a:solidFill>
-                  <a:schemeClr val="tx1">
-                    <a:lumMod val="75000"/>
-                    <a:lumOff val="25000"/>
-                  </a:schemeClr>
-                </a:solidFill>
-                <a:latin typeface="Segoe UI Light" panose="020B0502040204020203" pitchFamily="34" charset="0"/>
-                <a:cs typeface="Segoe UI Light" panose="020B0502040204020203" pitchFamily="34" charset="0"/>
-              </a:rPr>
-              <a:t> </a:t>
-            </a:r>
-            <a:r>
-              <a:rPr lang="en-US" sz="1400" dirty="0" err="1">
-                <a:solidFill>
-                  <a:schemeClr val="tx1">
-                    <a:lumMod val="75000"/>
-                    <a:lumOff val="25000"/>
-                  </a:schemeClr>
-                </a:solidFill>
-                <a:latin typeface="Segoe UI Light" panose="020B0502040204020203" pitchFamily="34" charset="0"/>
-                <a:cs typeface="Segoe UI Light" panose="020B0502040204020203" pitchFamily="34" charset="0"/>
-              </a:rPr>
-              <a:t>labore</a:t>
-            </a:r>
-            <a:r>
-              <a:rPr lang="en-US" sz="1400" dirty="0">
-                <a:solidFill>
-                  <a:schemeClr val="tx1">
-                    <a:lumMod val="75000"/>
-                    <a:lumOff val="25000"/>
-                  </a:schemeClr>
-                </a:solidFill>
-                <a:latin typeface="Segoe UI Light" panose="020B0502040204020203" pitchFamily="34" charset="0"/>
-                <a:cs typeface="Segoe UI Light" panose="020B0502040204020203" pitchFamily="34" charset="0"/>
-              </a:rPr>
-              <a:t> et dolore magna </a:t>
-            </a:r>
-            <a:r>
-              <a:rPr lang="en-US" sz="1400" dirty="0" err="1">
-                <a:solidFill>
-                  <a:schemeClr val="tx1">
-                    <a:lumMod val="75000"/>
-                    <a:lumOff val="25000"/>
-                  </a:schemeClr>
-                </a:solidFill>
-                <a:latin typeface="Segoe UI Light" panose="020B0502040204020203" pitchFamily="34" charset="0"/>
-                <a:cs typeface="Segoe UI Light" panose="020B0502040204020203" pitchFamily="34" charset="0"/>
-              </a:rPr>
-              <a:t>aliqua</a:t>
-            </a:r>
-            <a:r>
-              <a:rPr lang="en-US" sz="1400" dirty="0">
-                <a:solidFill>
-                  <a:schemeClr val="tx1">
-                    <a:lumMod val="75000"/>
-                    <a:lumOff val="25000"/>
-                  </a:schemeClr>
-                </a:solidFill>
-                <a:latin typeface="Segoe UI Light" panose="020B0502040204020203" pitchFamily="34" charset="0"/>
-                <a:cs typeface="Segoe UI Light" panose="020B0502040204020203" pitchFamily="34" charset="0"/>
-              </a:rPr>
-              <a:t>. Ut </a:t>
-            </a:r>
-            <a:r>
-              <a:rPr lang="en-US" sz="1400" dirty="0" err="1">
-                <a:solidFill>
-                  <a:schemeClr val="tx1">
-                    <a:lumMod val="75000"/>
-                    <a:lumOff val="25000"/>
-                  </a:schemeClr>
-                </a:solidFill>
-                <a:latin typeface="Segoe UI Light" panose="020B0502040204020203" pitchFamily="34" charset="0"/>
-                <a:cs typeface="Segoe UI Light" panose="020B0502040204020203" pitchFamily="34" charset="0"/>
-              </a:rPr>
-              <a:t>enim</a:t>
-            </a:r>
-            <a:r>
-              <a:rPr lang="en-US" sz="1400" dirty="0">
-                <a:solidFill>
-                  <a:schemeClr val="tx1">
-                    <a:lumMod val="75000"/>
-                    <a:lumOff val="25000"/>
-                  </a:schemeClr>
-                </a:solidFill>
-                <a:latin typeface="Segoe UI Light" panose="020B0502040204020203" pitchFamily="34" charset="0"/>
-                <a:cs typeface="Segoe UI Light" panose="020B0502040204020203" pitchFamily="34" charset="0"/>
-              </a:rPr>
-              <a:t> ad minim </a:t>
-            </a:r>
-            <a:r>
-              <a:rPr lang="en-US" sz="1400" dirty="0" err="1">
-                <a:solidFill>
-                  <a:schemeClr val="tx1">
-                    <a:lumMod val="75000"/>
-                    <a:lumOff val="25000"/>
-                  </a:schemeClr>
-                </a:solidFill>
-                <a:latin typeface="Segoe UI Light" panose="020B0502040204020203" pitchFamily="34" charset="0"/>
-                <a:cs typeface="Segoe UI Light" panose="020B0502040204020203" pitchFamily="34" charset="0"/>
-              </a:rPr>
-              <a:t>veniam</a:t>
-            </a:r>
-            <a:r>
-              <a:rPr lang="en-US" sz="1400" dirty="0">
-                <a:solidFill>
-                  <a:schemeClr val="tx1">
-                    <a:lumMod val="75000"/>
-                    <a:lumOff val="25000"/>
-                  </a:schemeClr>
-                </a:solidFill>
-                <a:latin typeface="Segoe UI Light" panose="020B0502040204020203" pitchFamily="34" charset="0"/>
-                <a:cs typeface="Segoe UI Light" panose="020B0502040204020203" pitchFamily="34" charset="0"/>
-              </a:rPr>
-              <a:t>, </a:t>
-            </a:r>
-            <a:r>
-              <a:rPr lang="en-US" sz="1400" dirty="0" err="1">
-                <a:solidFill>
-                  <a:schemeClr val="tx1">
-                    <a:lumMod val="75000"/>
-                    <a:lumOff val="25000"/>
-                  </a:schemeClr>
-                </a:solidFill>
-                <a:latin typeface="Segoe UI Light" panose="020B0502040204020203" pitchFamily="34" charset="0"/>
-                <a:cs typeface="Segoe UI Light" panose="020B0502040204020203" pitchFamily="34" charset="0"/>
-              </a:rPr>
-              <a:t>quis</a:t>
-            </a:r>
-            <a:r>
-              <a:rPr lang="en-US" sz="1400" dirty="0">
-                <a:solidFill>
-                  <a:schemeClr val="tx1">
-                    <a:lumMod val="75000"/>
-                    <a:lumOff val="25000"/>
-                  </a:schemeClr>
-                </a:solidFill>
-                <a:latin typeface="Segoe UI Light" panose="020B0502040204020203" pitchFamily="34" charset="0"/>
-                <a:cs typeface="Segoe UI Light" panose="020B0502040204020203" pitchFamily="34" charset="0"/>
-              </a:rPr>
-              <a:t> </a:t>
-            </a:r>
-            <a:r>
-              <a:rPr lang="en-US" sz="1400" dirty="0" err="1">
-                <a:solidFill>
-                  <a:schemeClr val="tx1">
-                    <a:lumMod val="75000"/>
-                    <a:lumOff val="25000"/>
-                  </a:schemeClr>
-                </a:solidFill>
-                <a:latin typeface="Segoe UI Light" panose="020B0502040204020203" pitchFamily="34" charset="0"/>
-                <a:cs typeface="Segoe UI Light" panose="020B0502040204020203" pitchFamily="34" charset="0"/>
-              </a:rPr>
-              <a:t>nostrud</a:t>
-            </a:r>
-            <a:r>
-              <a:rPr lang="en-US" sz="1400" dirty="0">
-                <a:solidFill>
-                  <a:schemeClr val="tx1">
-                    <a:lumMod val="75000"/>
-                    <a:lumOff val="25000"/>
-                  </a:schemeClr>
-                </a:solidFill>
-                <a:latin typeface="Segoe UI Light" panose="020B0502040204020203" pitchFamily="34" charset="0"/>
-                <a:cs typeface="Segoe UI Light" panose="020B0502040204020203" pitchFamily="34" charset="0"/>
-              </a:rPr>
-              <a:t> exercitation </a:t>
-            </a:r>
-            <a:r>
-              <a:rPr lang="en-US" sz="1400" dirty="0" err="1">
-                <a:solidFill>
-                  <a:schemeClr val="tx1">
-                    <a:lumMod val="75000"/>
-                    <a:lumOff val="25000"/>
-                  </a:schemeClr>
-                </a:solidFill>
-                <a:latin typeface="Segoe UI Light" panose="020B0502040204020203" pitchFamily="34" charset="0"/>
-                <a:cs typeface="Segoe UI Light" panose="020B0502040204020203" pitchFamily="34" charset="0"/>
-              </a:rPr>
-              <a:t>ullamco</a:t>
-            </a:r>
-            <a:r>
-              <a:rPr lang="en-US" sz="1400" dirty="0">
-                <a:solidFill>
-                  <a:schemeClr val="tx1">
-                    <a:lumMod val="75000"/>
-                    <a:lumOff val="25000"/>
-                  </a:schemeClr>
-                </a:solidFill>
-                <a:latin typeface="Segoe UI Light" panose="020B0502040204020203" pitchFamily="34" charset="0"/>
-                <a:cs typeface="Segoe UI Light" panose="020B0502040204020203" pitchFamily="34" charset="0"/>
-              </a:rPr>
-              <a:t> </a:t>
-            </a:r>
-            <a:r>
-              <a:rPr lang="en-US" sz="1400" dirty="0" err="1">
-                <a:solidFill>
-                  <a:schemeClr val="tx1">
-                    <a:lumMod val="75000"/>
-                    <a:lumOff val="25000"/>
-                  </a:schemeClr>
-                </a:solidFill>
-                <a:latin typeface="Segoe UI Light" panose="020B0502040204020203" pitchFamily="34" charset="0"/>
-                <a:cs typeface="Segoe UI Light" panose="020B0502040204020203" pitchFamily="34" charset="0"/>
-              </a:rPr>
-              <a:t>laboris</a:t>
-            </a:r>
-            <a:r>
-              <a:rPr lang="en-US" sz="1400" dirty="0">
-                <a:solidFill>
-                  <a:schemeClr val="tx1">
-                    <a:lumMod val="75000"/>
-                    <a:lumOff val="25000"/>
-                  </a:schemeClr>
-                </a:solidFill>
-                <a:latin typeface="Segoe UI Light" panose="020B0502040204020203" pitchFamily="34" charset="0"/>
-                <a:cs typeface="Segoe UI Light" panose="020B0502040204020203" pitchFamily="34" charset="0"/>
-              </a:rPr>
-              <a:t> nisi </a:t>
-            </a:r>
-            <a:r>
-              <a:rPr lang="en-US" sz="1400" dirty="0" err="1">
-                <a:solidFill>
-                  <a:schemeClr val="tx1">
-                    <a:lumMod val="75000"/>
-                    <a:lumOff val="25000"/>
-                  </a:schemeClr>
-                </a:solidFill>
-                <a:latin typeface="Segoe UI Light" panose="020B0502040204020203" pitchFamily="34" charset="0"/>
-                <a:cs typeface="Segoe UI Light" panose="020B0502040204020203" pitchFamily="34" charset="0"/>
-              </a:rPr>
-              <a:t>ut</a:t>
-            </a:r>
-            <a:r>
-              <a:rPr lang="en-US" sz="1400" dirty="0">
-                <a:solidFill>
-                  <a:schemeClr val="tx1">
-                    <a:lumMod val="75000"/>
-                    <a:lumOff val="25000"/>
-                  </a:schemeClr>
-                </a:solidFill>
-                <a:latin typeface="Segoe UI Light" panose="020B0502040204020203" pitchFamily="34" charset="0"/>
-                <a:cs typeface="Segoe UI Light" panose="020B0502040204020203" pitchFamily="34" charset="0"/>
-              </a:rPr>
-              <a:t> </a:t>
-            </a:r>
-            <a:r>
-              <a:rPr lang="en-US" sz="1400" dirty="0" err="1">
-                <a:solidFill>
-                  <a:schemeClr val="tx1">
-                    <a:lumMod val="75000"/>
-                    <a:lumOff val="25000"/>
-                  </a:schemeClr>
-                </a:solidFill>
-                <a:latin typeface="Segoe UI Light" panose="020B0502040204020203" pitchFamily="34" charset="0"/>
-                <a:cs typeface="Segoe UI Light" panose="020B0502040204020203" pitchFamily="34" charset="0"/>
-              </a:rPr>
-              <a:t>aliquip</a:t>
-            </a:r>
-            <a:r>
-              <a:rPr lang="en-US" sz="1400" dirty="0">
-                <a:solidFill>
-                  <a:schemeClr val="tx1">
-                    <a:lumMod val="75000"/>
-                    <a:lumOff val="25000"/>
-                  </a:schemeClr>
-                </a:solidFill>
-                <a:latin typeface="Segoe UI Light" panose="020B0502040204020203" pitchFamily="34" charset="0"/>
-                <a:cs typeface="Segoe UI Light" panose="020B0502040204020203" pitchFamily="34" charset="0"/>
-              </a:rPr>
-              <a:t> ex </a:t>
-            </a:r>
-            <a:r>
-              <a:rPr lang="en-US" sz="1400" dirty="0" err="1">
-                <a:solidFill>
-                  <a:schemeClr val="tx1">
-                    <a:lumMod val="75000"/>
-                    <a:lumOff val="25000"/>
-                  </a:schemeClr>
-                </a:solidFill>
-                <a:latin typeface="Segoe UI Light" panose="020B0502040204020203" pitchFamily="34" charset="0"/>
-                <a:cs typeface="Segoe UI Light" panose="020B0502040204020203" pitchFamily="34" charset="0"/>
-              </a:rPr>
-              <a:t>ea</a:t>
-            </a:r>
-            <a:r>
-              <a:rPr lang="en-US" sz="1400" dirty="0">
-                <a:solidFill>
-                  <a:schemeClr val="tx1">
-                    <a:lumMod val="75000"/>
-                    <a:lumOff val="25000"/>
-                  </a:schemeClr>
-                </a:solidFill>
-                <a:latin typeface="Segoe UI Light" panose="020B0502040204020203" pitchFamily="34" charset="0"/>
-                <a:cs typeface="Segoe UI Light" panose="020B0502040204020203" pitchFamily="34" charset="0"/>
-              </a:rPr>
-              <a:t> </a:t>
-            </a:r>
-            <a:r>
-              <a:rPr lang="en-US" sz="1400" dirty="0" err="1">
-                <a:solidFill>
-                  <a:schemeClr val="tx1">
-                    <a:lumMod val="75000"/>
-                    <a:lumOff val="25000"/>
-                  </a:schemeClr>
-                </a:solidFill>
-                <a:latin typeface="Segoe UI Light" panose="020B0502040204020203" pitchFamily="34" charset="0"/>
-                <a:cs typeface="Segoe UI Light" panose="020B0502040204020203" pitchFamily="34" charset="0"/>
-              </a:rPr>
-              <a:t>commodo</a:t>
-            </a:r>
-            <a:r>
-              <a:rPr lang="en-US" sz="1400" dirty="0">
-                <a:solidFill>
-                  <a:schemeClr val="tx1">
-                    <a:lumMod val="75000"/>
-                    <a:lumOff val="25000"/>
-                  </a:schemeClr>
-                </a:solidFill>
-                <a:latin typeface="Segoe UI Light" panose="020B0502040204020203" pitchFamily="34" charset="0"/>
-                <a:cs typeface="Segoe UI Light" panose="020B0502040204020203" pitchFamily="34" charset="0"/>
-              </a:rPr>
-              <a:t> </a:t>
-            </a:r>
-            <a:r>
-              <a:rPr lang="en-US" sz="1400" dirty="0" err="1">
-                <a:solidFill>
-                  <a:schemeClr val="tx1">
-                    <a:lumMod val="75000"/>
-                    <a:lumOff val="25000"/>
-                  </a:schemeClr>
-                </a:solidFill>
-                <a:latin typeface="Segoe UI Light" panose="020B0502040204020203" pitchFamily="34" charset="0"/>
-                <a:cs typeface="Segoe UI Light" panose="020B0502040204020203" pitchFamily="34" charset="0"/>
-              </a:rPr>
-              <a:t>consequat</a:t>
-            </a:r>
-            <a:r>
-              <a:rPr lang="en-US" sz="1400" dirty="0">
-                <a:solidFill>
-                  <a:schemeClr val="tx1">
-                    <a:lumMod val="75000"/>
-                    <a:lumOff val="25000"/>
-                  </a:schemeClr>
-                </a:solidFill>
-                <a:latin typeface="Segoe UI Light" panose="020B0502040204020203" pitchFamily="34" charset="0"/>
-                <a:cs typeface="Segoe UI Light" panose="020B0502040204020203" pitchFamily="34" charset="0"/>
-              </a:rPr>
-              <a:t>.</a:t>
-            </a:r>
-          </a:p>
-        </p:txBody>
-      </p:sp>
       <p:sp>
         <p:nvSpPr>
           <p:cNvPr id="2" name="Date Placeholder 1"/>
@@ -8111,7 +6104,7 @@
           <a:p>
             <a:fld id="{5D2A5BCA-CFD9-4AED-A589-E41154D4A6DF}" type="datetime1">
               <a:rPr lang="en-US" smtClean="0"/>
-              <a:t>11/4/2022</a:t>
+              <a:t>11/6/2022</a:t>
             </a:fld>
             <a:endParaRPr lang="en-US"/>
           </a:p>
@@ -8367,6 +6360,161 @@
           </p:txBody>
         </p:sp>
       </p:grpSp>
+      <p:pic>
+        <p:nvPicPr>
+          <p:cNvPr id="5" name="Afbeelding 4">
+            <a:extLst>
+              <a:ext uri="{FF2B5EF4-FFF2-40B4-BE49-F238E27FC236}">
+                <a16:creationId xmlns:a16="http://schemas.microsoft.com/office/drawing/2014/main" id="{49B9FE59-CEEE-A4BF-CDAD-5DB3E6D2E36C}"/>
+              </a:ext>
+            </a:extLst>
+          </p:cNvPr>
+          <p:cNvPicPr>
+            <a:picLocks noChangeAspect="1"/>
+          </p:cNvPicPr>
+          <p:nvPr/>
+        </p:nvPicPr>
+        <p:blipFill>
+          <a:blip r:embed="rId2">
+            <a:extLst>
+              <a:ext uri="{28A0092B-C50C-407E-A947-70E740481C1C}">
+                <a14:useLocalDpi xmlns:a14="http://schemas.microsoft.com/office/drawing/2010/main" val="0"/>
+              </a:ext>
+            </a:extLst>
+          </a:blip>
+          <a:stretch>
+            <a:fillRect/>
+          </a:stretch>
+        </p:blipFill>
+        <p:spPr>
+          <a:xfrm>
+            <a:off x="7050281" y="1838282"/>
+            <a:ext cx="4619714" cy="2887321"/>
+          </a:xfrm>
+          <a:prstGeom prst="rect">
+            <a:avLst/>
+          </a:prstGeom>
+        </p:spPr>
+      </p:pic>
+      <p:sp>
+        <p:nvSpPr>
+          <p:cNvPr id="6" name="Tekstvak 5">
+            <a:extLst>
+              <a:ext uri="{FF2B5EF4-FFF2-40B4-BE49-F238E27FC236}">
+                <a16:creationId xmlns:a16="http://schemas.microsoft.com/office/drawing/2014/main" id="{F10F8F79-E1B6-0F91-CCBC-ED84F56F6284}"/>
+              </a:ext>
+            </a:extLst>
+          </p:cNvPr>
+          <p:cNvSpPr txBox="1"/>
+          <p:nvPr/>
+        </p:nvSpPr>
+        <p:spPr>
+          <a:xfrm>
+            <a:off x="440896" y="1304824"/>
+            <a:ext cx="4560606" cy="2585323"/>
+          </a:xfrm>
+          <a:prstGeom prst="rect">
+            <a:avLst/>
+          </a:prstGeom>
+          <a:noFill/>
+        </p:spPr>
+        <p:txBody>
+          <a:bodyPr wrap="square" rtlCol="0">
+            <a:spAutoFit/>
+          </a:bodyPr>
+          <a:lstStyle/>
+          <a:p>
+            <a:r>
+              <a:rPr lang="nl-BE" dirty="0"/>
+              <a:t>JSON Document store</a:t>
+            </a:r>
+          </a:p>
+          <a:p>
+            <a:pPr marL="285750" indent="-285750">
+              <a:buFontTx/>
+              <a:buChar char="-"/>
+            </a:pPr>
+            <a:r>
+              <a:rPr lang="nl-BE" dirty="0" err="1"/>
+              <a:t>Collections</a:t>
+            </a:r>
+            <a:r>
+              <a:rPr lang="nl-BE" dirty="0"/>
+              <a:t> </a:t>
+            </a:r>
+            <a:r>
+              <a:rPr lang="nl-BE" dirty="0" err="1"/>
+              <a:t>ipv</a:t>
+            </a:r>
+            <a:r>
+              <a:rPr lang="nl-BE" dirty="0"/>
+              <a:t> </a:t>
+            </a:r>
+            <a:r>
+              <a:rPr lang="nl-BE" dirty="0" err="1"/>
+              <a:t>tables</a:t>
+            </a:r>
+            <a:endParaRPr lang="nl-BE" dirty="0"/>
+          </a:p>
+          <a:p>
+            <a:pPr marL="285750" indent="-285750">
+              <a:buFontTx/>
+              <a:buChar char="-"/>
+            </a:pPr>
+            <a:r>
+              <a:rPr lang="nl-BE" dirty="0"/>
+              <a:t>Ongeordende data</a:t>
+            </a:r>
+          </a:p>
+          <a:p>
+            <a:pPr marL="285750" indent="-285750">
+              <a:buFontTx/>
+              <a:buChar char="-"/>
+            </a:pPr>
+            <a:r>
+              <a:rPr lang="nl-BE" dirty="0"/>
+              <a:t>Werkt goed met OOP talen</a:t>
+            </a:r>
+          </a:p>
+          <a:p>
+            <a:pPr marL="285750" indent="-285750">
+              <a:buFontTx/>
+              <a:buChar char="-"/>
+            </a:pPr>
+            <a:r>
+              <a:rPr lang="nl-BE" dirty="0"/>
+              <a:t>Geen strikt database schema</a:t>
+            </a:r>
+          </a:p>
+          <a:p>
+            <a:pPr marL="285750" indent="-285750">
+              <a:buFontTx/>
+              <a:buChar char="-"/>
+            </a:pPr>
+            <a:endParaRPr lang="nl-BE" dirty="0"/>
+          </a:p>
+          <a:p>
+            <a:r>
+              <a:rPr lang="nl-BE" dirty="0"/>
+              <a:t>Zeer goede verticale en horizontale </a:t>
+            </a:r>
+            <a:r>
+              <a:rPr lang="nl-BE" dirty="0" err="1"/>
+              <a:t>scaling</a:t>
+            </a:r>
+            <a:endParaRPr lang="nl-BE" dirty="0"/>
+          </a:p>
+          <a:p>
+            <a:endParaRPr lang="nl-BE" dirty="0"/>
+          </a:p>
+          <a:p>
+            <a:r>
+              <a:rPr lang="nl-BE" dirty="0"/>
+              <a:t>Gemaakt voor projecten groot en klein</a:t>
+            </a:r>
+          </a:p>
+        </p:txBody>
+      </p:sp>
     </p:spTree>
     <p:extLst>
       <p:ext uri="{BB962C8B-B14F-4D97-AF65-F5344CB8AC3E}">
@@ -8414,7 +6562,7 @@
           <a:p>
             <a:fld id="{5D2A5BCA-CFD9-4AED-A589-E41154D4A6DF}" type="datetime1">
               <a:rPr lang="en-US" smtClean="0"/>
-              <a:t>11/4/2022</a:t>
+              <a:t>11/6/2022</a:t>
             </a:fld>
             <a:endParaRPr lang="en-US"/>
           </a:p>

</xml_diff>